<commit_message>
Add System requirements specification to ppp.
</commit_message>
<xml_diff>
--- a/doc/task02/Presentation_2.pptx
+++ b/doc/task02/Presentation_2.pptx
@@ -5,15 +5,16 @@
     <p:sldMasterId id="2147483648" r:id="rId1"/>
   </p:sldMasterIdLst>
   <p:notesMasterIdLst>
-    <p:notesMasterId r:id="rId5"/>
+    <p:notesMasterId r:id="rId6"/>
   </p:notesMasterIdLst>
   <p:handoutMasterIdLst>
-    <p:handoutMasterId r:id="rId6"/>
+    <p:handoutMasterId r:id="rId7"/>
   </p:handoutMasterIdLst>
   <p:sldIdLst>
     <p:sldId id="262" r:id="rId2"/>
     <p:sldId id="289" r:id="rId3"/>
-    <p:sldId id="285" r:id="rId4"/>
+    <p:sldId id="290" r:id="rId4"/>
+    <p:sldId id="285" r:id="rId5"/>
   </p:sldIdLst>
   <p:sldSz cx="12192000" cy="6858000"/>
   <p:notesSz cx="6858000" cy="9144000"/>
@@ -218,7 +219,7 @@
             <a:pPr rtl="0"/>
             <a:fld id="{960672BD-261C-4EDC-9C5E-C246835120E7}" type="datetime1">
               <a:rPr lang="de-DE" smtClean="0"/>
-              <a:t>15.04.2018</a:t>
+              <a:t>15.04.18</a:t>
             </a:fld>
             <a:endParaRPr lang="de-DE" dirty="0"/>
           </a:p>
@@ -286,7 +287,7 @@
             <a:pPr rtl="0"/>
             <a:fld id="{7798501B-77B5-4365-9881-C6E19A3C1E42}" type="slidenum">
               <a:rPr lang="de-DE" smtClean="0"/>
-              <a:t>‹Nr.›</a:t>
+              <a:t>‹#›</a:t>
             </a:fld>
             <a:endParaRPr lang="de-DE" dirty="0"/>
           </a:p>
@@ -388,7 +389,7 @@
             <a:pPr rtl="0"/>
             <a:fld id="{6B5664F4-ABD2-4F09-9758-D36145E15169}" type="datetime1">
               <a:rPr lang="de-DE" smtClean="0"/>
-              <a:t>15.04.2018</a:t>
+              <a:t>15.04.18</a:t>
             </a:fld>
             <a:endParaRPr lang="de-DE" dirty="0"/>
           </a:p>
@@ -549,7 +550,7 @@
             <a:pPr rtl="0"/>
             <a:fld id="{FC8BD8E7-1312-41F3-99C4-6DA5AF891969}" type="slidenum">
               <a:rPr lang="de-DE" smtClean="0"/>
-              <a:t>‹Nr.›</a:t>
+              <a:t>‹#›</a:t>
             </a:fld>
             <a:endParaRPr lang="de-DE" dirty="0"/>
           </a:p>
@@ -1449,7 +1450,7 @@
             <a:pPr rtl="0"/>
             <a:fld id="{6D86D372-411D-4B4E-9C3F-27EFF2F8BE1E}" type="datetime1">
               <a:rPr lang="de-DE" smtClean="0"/>
-              <a:t>15.04.2018</a:t>
+              <a:t>15.04.18</a:t>
             </a:fld>
             <a:endParaRPr lang="de-DE" dirty="0"/>
           </a:p>
@@ -1473,7 +1474,7 @@
             <a:pPr rtl="0"/>
             <a:fld id="{E31375A4-56A4-47D6-9801-1991572033F7}" type="slidenum">
               <a:rPr lang="de-DE" smtClean="0"/>
-              <a:t>‹Nr.›</a:t>
+              <a:t>‹#›</a:t>
             </a:fld>
             <a:endParaRPr lang="de-DE" dirty="0"/>
           </a:p>
@@ -1656,7 +1657,7 @@
             <a:pPr rtl="0"/>
             <a:fld id="{E326EB1D-CBBF-438D-A188-239583155CD5}" type="datetime1">
               <a:rPr lang="de-DE" smtClean="0"/>
-              <a:t>15.04.2018</a:t>
+              <a:t>15.04.18</a:t>
             </a:fld>
             <a:endParaRPr lang="de-DE" dirty="0"/>
           </a:p>
@@ -1680,7 +1681,7 @@
             <a:pPr rtl="0"/>
             <a:fld id="{E31375A4-56A4-47D6-9801-1991572033F7}" type="slidenum">
               <a:rPr lang="de-DE" smtClean="0"/>
-              <a:t>‹Nr.›</a:t>
+              <a:t>‹#›</a:t>
             </a:fld>
             <a:endParaRPr lang="de-DE" dirty="0"/>
           </a:p>
@@ -2266,7 +2267,7 @@
             <a:pPr rtl="0"/>
             <a:fld id="{0158FB9A-9055-4D91-A8D6-422B1A47ADD6}" type="datetime1">
               <a:rPr lang="de-DE" smtClean="0"/>
-              <a:t>15.04.2018</a:t>
+              <a:t>15.04.18</a:t>
             </a:fld>
             <a:endParaRPr lang="de-DE" dirty="0"/>
           </a:p>
@@ -2290,7 +2291,7 @@
             <a:pPr rtl="0"/>
             <a:fld id="{E31375A4-56A4-47D6-9801-1991572033F7}" type="slidenum">
               <a:rPr lang="de-DE" smtClean="0"/>
-              <a:t>‹Nr.›</a:t>
+              <a:t>‹#›</a:t>
             </a:fld>
             <a:endParaRPr lang="de-DE" dirty="0"/>
           </a:p>
@@ -2789,7 +2790,7 @@
             <a:pPr rtl="0"/>
             <a:fld id="{F3AD2B2A-001E-4204-A9F7-ADB62FDFB3C2}" type="datetime1">
               <a:rPr lang="de-DE" smtClean="0"/>
-              <a:t>15.04.2018</a:t>
+              <a:t>15.04.18</a:t>
             </a:fld>
             <a:endParaRPr lang="de-DE" dirty="0"/>
           </a:p>
@@ -2813,7 +2814,7 @@
             <a:pPr rtl="0"/>
             <a:fld id="{E31375A4-56A4-47D6-9801-1991572033F7}" type="slidenum">
               <a:rPr lang="de-DE" smtClean="0"/>
-              <a:t>‹Nr.›</a:t>
+              <a:t>‹#›</a:t>
             </a:fld>
             <a:endParaRPr lang="de-DE" dirty="0"/>
           </a:p>
@@ -3247,7 +3248,7 @@
             <a:pPr rtl="0"/>
             <a:fld id="{D0598511-F564-4313-9C85-1BB6BF3D8A32}" type="datetime1">
               <a:rPr lang="de-DE" smtClean="0"/>
-              <a:t>15.04.2018</a:t>
+              <a:t>15.04.18</a:t>
             </a:fld>
             <a:endParaRPr lang="de-DE" dirty="0"/>
           </a:p>
@@ -3271,7 +3272,7 @@
             <a:pPr rtl="0"/>
             <a:fld id="{E31375A4-56A4-47D6-9801-1991572033F7}" type="slidenum">
               <a:rPr lang="de-DE" smtClean="0"/>
-              <a:t>‹Nr.›</a:t>
+              <a:t>‹#›</a:t>
             </a:fld>
             <a:endParaRPr lang="de-DE" dirty="0"/>
           </a:p>
@@ -3385,7 +3386,7 @@
             <a:pPr rtl="0"/>
             <a:fld id="{2E8B8011-CBA9-4FB0-934D-C2F23F0053DB}" type="datetime1">
               <a:rPr lang="de-DE" smtClean="0"/>
-              <a:t>15.04.2018</a:t>
+              <a:t>15.04.18</a:t>
             </a:fld>
             <a:endParaRPr lang="de-DE" dirty="0"/>
           </a:p>
@@ -3409,7 +3410,7 @@
             <a:pPr rtl="0"/>
             <a:fld id="{E31375A4-56A4-47D6-9801-1991572033F7}" type="slidenum">
               <a:rPr lang="de-DE" smtClean="0"/>
-              <a:t>‹Nr.›</a:t>
+              <a:t>‹#›</a:t>
             </a:fld>
             <a:endParaRPr lang="de-DE" dirty="0"/>
           </a:p>
@@ -3731,7 +3732,7 @@
             <a:pPr rtl="0"/>
             <a:fld id="{62C0A95F-FFB2-4410-A448-2C54BE7723F4}" type="datetime1">
               <a:rPr lang="de-DE" smtClean="0"/>
-              <a:t>15.04.2018</a:t>
+              <a:t>15.04.18</a:t>
             </a:fld>
             <a:endParaRPr lang="de-DE" dirty="0"/>
           </a:p>
@@ -3755,7 +3756,7 @@
             <a:pPr rtl="0"/>
             <a:fld id="{E31375A4-56A4-47D6-9801-1991572033F7}" type="slidenum">
               <a:rPr lang="de-DE" smtClean="0"/>
-              <a:t>‹Nr.›</a:t>
+              <a:t>‹#›</a:t>
             </a:fld>
             <a:endParaRPr lang="de-DE" dirty="0"/>
           </a:p>
@@ -4025,7 +4026,7 @@
             <a:pPr rtl="0"/>
             <a:fld id="{8C96ADC6-BDC4-42FB-97FB-DA73ECD9CEE8}" type="datetime1">
               <a:rPr lang="de-DE" smtClean="0"/>
-              <a:t>15.04.2018</a:t>
+              <a:t>15.04.18</a:t>
             </a:fld>
             <a:endParaRPr lang="de-DE" dirty="0"/>
           </a:p>
@@ -4066,7 +4067,7 @@
             <a:fld id="{E31375A4-56A4-47D6-9801-1991572033F7}" type="slidenum">
               <a:rPr lang="de-DE" smtClean="0"/>
               <a:pPr rtl="0"/>
-              <a:t>‹Nr.›</a:t>
+              <a:t>‹#›</a:t>
             </a:fld>
             <a:endParaRPr lang="de-DE" dirty="0"/>
           </a:p>
@@ -4564,7 +4565,7 @@
           <p:cNvPr id="10" name="Bildplatzhalter 9">
             <a:extLst>
               <a:ext uri="{FF2B5EF4-FFF2-40B4-BE49-F238E27FC236}">
-                <a16:creationId xmlns:a16="http://schemas.microsoft.com/office/drawing/2014/main" id="{C29F7C63-F3E3-44C4-851B-F7913AA9706D}"/>
+                <a16:creationId xmlns:a16="http://schemas.microsoft.com/office/drawing/2014/main" xmlns="" id="{C29F7C63-F3E3-44C4-851B-F7913AA9706D}"/>
               </a:ext>
             </a:extLst>
           </p:cNvPr>
@@ -4598,7 +4599,7 @@
           <p:cNvPr id="14" name="Bildplatzhalter 13">
             <a:extLst>
               <a:ext uri="{FF2B5EF4-FFF2-40B4-BE49-F238E27FC236}">
-                <a16:creationId xmlns:a16="http://schemas.microsoft.com/office/drawing/2014/main" id="{A340DC10-DD9A-4562-AAFD-3AD5F391991D}"/>
+                <a16:creationId xmlns:a16="http://schemas.microsoft.com/office/drawing/2014/main" xmlns="" id="{A340DC10-DD9A-4562-AAFD-3AD5F391991D}"/>
               </a:ext>
             </a:extLst>
           </p:cNvPr>
@@ -4632,7 +4633,7 @@
           <p:cNvPr id="18" name="Bildplatzhalter 17">
             <a:extLst>
               <a:ext uri="{FF2B5EF4-FFF2-40B4-BE49-F238E27FC236}">
-                <a16:creationId xmlns:a16="http://schemas.microsoft.com/office/drawing/2014/main" id="{40F64AC5-1EA3-4330-9CA7-B95506CD16D4}"/>
+                <a16:creationId xmlns:a16="http://schemas.microsoft.com/office/drawing/2014/main" xmlns="" id="{40F64AC5-1EA3-4330-9CA7-B95506CD16D4}"/>
               </a:ext>
             </a:extLst>
           </p:cNvPr>
@@ -4731,7 +4732,7 @@
           <p:cNvPr id="18" name="Inhaltsplatzhalter 17">
             <a:extLst>
               <a:ext uri="{FF2B5EF4-FFF2-40B4-BE49-F238E27FC236}">
-                <a16:creationId xmlns:a16="http://schemas.microsoft.com/office/drawing/2014/main" id="{0C719E4D-A698-413D-BA3C-5FAB44B613F4}"/>
+                <a16:creationId xmlns:a16="http://schemas.microsoft.com/office/drawing/2014/main" xmlns="" id="{0C719E4D-A698-413D-BA3C-5FAB44B613F4}"/>
               </a:ext>
             </a:extLst>
           </p:cNvPr>
@@ -4907,10 +4908,265 @@
       </p:grpSpPr>
       <p:sp>
         <p:nvSpPr>
+          <p:cNvPr id="2" name="Title 1"/>
+          <p:cNvSpPr>
+            <a:spLocks noGrp="1"/>
+          </p:cNvSpPr>
+          <p:nvPr>
+            <p:ph type="title"/>
+          </p:nvPr>
+        </p:nvSpPr>
+        <p:spPr/>
+        <p:txBody>
+          <a:bodyPr/>
+          <a:lstStyle/>
+          <a:p>
+            <a:r>
+              <a:rPr lang="en-US" dirty="0" smtClean="0"/>
+              <a:t>System Requirement Specification</a:t>
+            </a:r>
+            <a:endParaRPr lang="en-US" dirty="0"/>
+          </a:p>
+        </p:txBody>
+      </p:sp>
+      <p:sp>
+        <p:nvSpPr>
+          <p:cNvPr id="3" name="Content Placeholder 2"/>
+          <p:cNvSpPr>
+            <a:spLocks noGrp="1"/>
+          </p:cNvSpPr>
+          <p:nvPr>
+            <p:ph sz="half" idx="1"/>
+          </p:nvPr>
+        </p:nvSpPr>
+        <p:spPr/>
+        <p:txBody>
+          <a:bodyPr>
+            <a:normAutofit fontScale="92500" lnSpcReduction="20000"/>
+          </a:bodyPr>
+          <a:lstStyle/>
+          <a:p>
+            <a:r>
+              <a:rPr lang="en-US" dirty="0" smtClean="0"/>
+              <a:t>Functional Requirements</a:t>
+            </a:r>
+          </a:p>
+          <a:p>
+            <a:endParaRPr lang="en-US" dirty="0" smtClean="0"/>
+          </a:p>
+          <a:p>
+            <a:pPr lvl="1"/>
+            <a:r>
+              <a:rPr lang="en-US" dirty="0" err="1" smtClean="0"/>
+              <a:t>Angehörigen-Tagebuch</a:t>
+            </a:r>
+            <a:endParaRPr lang="en-US" dirty="0" smtClean="0"/>
+          </a:p>
+          <a:p>
+            <a:pPr lvl="1"/>
+            <a:endParaRPr lang="en-US" dirty="0" smtClean="0"/>
+          </a:p>
+          <a:p>
+            <a:pPr lvl="1"/>
+            <a:r>
+              <a:rPr lang="en-US" dirty="0" err="1" smtClean="0"/>
+              <a:t>Patienten-Tagebuch</a:t>
+            </a:r>
+            <a:endParaRPr lang="en-US" dirty="0" smtClean="0"/>
+          </a:p>
+          <a:p>
+            <a:pPr lvl="1"/>
+            <a:endParaRPr lang="en-US" dirty="0" smtClean="0"/>
+          </a:p>
+          <a:p>
+            <a:pPr lvl="1"/>
+            <a:r>
+              <a:rPr lang="en-US" dirty="0" err="1" smtClean="0"/>
+              <a:t>Zielsetzungs</a:t>
+            </a:r>
+            <a:r>
+              <a:rPr lang="en-US" dirty="0" smtClean="0"/>
+              <a:t>-System</a:t>
+            </a:r>
+          </a:p>
+          <a:p>
+            <a:pPr lvl="1"/>
+            <a:endParaRPr lang="en-US" dirty="0" smtClean="0"/>
+          </a:p>
+          <a:p>
+            <a:pPr lvl="1"/>
+            <a:r>
+              <a:rPr lang="en-US" dirty="0" err="1" smtClean="0"/>
+              <a:t>Berechtigungssystem</a:t>
+            </a:r>
+            <a:endParaRPr lang="en-US" dirty="0" smtClean="0"/>
+          </a:p>
+          <a:p>
+            <a:pPr lvl="1"/>
+            <a:endParaRPr lang="en-US" dirty="0" smtClean="0"/>
+          </a:p>
+          <a:p>
+            <a:pPr lvl="1"/>
+            <a:r>
+              <a:rPr lang="en-US" dirty="0" smtClean="0"/>
+              <a:t>Responsive Design</a:t>
+            </a:r>
+          </a:p>
+          <a:p>
+            <a:pPr lvl="1"/>
+            <a:endParaRPr lang="en-US" dirty="0" smtClean="0"/>
+          </a:p>
+          <a:p>
+            <a:pPr lvl="1"/>
+            <a:r>
+              <a:rPr lang="en-US" dirty="0" smtClean="0"/>
+              <a:t>Data Store</a:t>
+            </a:r>
+          </a:p>
+          <a:p>
+            <a:pPr lvl="1"/>
+            <a:endParaRPr lang="en-US" dirty="0" smtClean="0"/>
+          </a:p>
+          <a:p>
+            <a:pPr lvl="1"/>
+            <a:r>
+              <a:rPr lang="en-US" dirty="0" smtClean="0"/>
+              <a:t>Development</a:t>
+            </a:r>
+            <a:endParaRPr lang="en-US" dirty="0"/>
+          </a:p>
+        </p:txBody>
+      </p:sp>
+      <p:sp>
+        <p:nvSpPr>
+          <p:cNvPr id="4" name="Content Placeholder 3"/>
+          <p:cNvSpPr>
+            <a:spLocks noGrp="1"/>
+          </p:cNvSpPr>
+          <p:nvPr>
+            <p:ph sz="half" idx="2"/>
+          </p:nvPr>
+        </p:nvSpPr>
+        <p:spPr/>
+        <p:txBody>
+          <a:bodyPr>
+            <a:normAutofit fontScale="92500" lnSpcReduction="20000"/>
+          </a:bodyPr>
+          <a:lstStyle/>
+          <a:p>
+            <a:r>
+              <a:rPr lang="en-US" dirty="0" smtClean="0"/>
+              <a:t>Non-Functional Requirements</a:t>
+            </a:r>
+          </a:p>
+          <a:p>
+            <a:pPr lvl="1"/>
+            <a:endParaRPr lang="en-US" dirty="0" smtClean="0"/>
+          </a:p>
+          <a:p>
+            <a:pPr lvl="1"/>
+            <a:r>
+              <a:rPr lang="en-US" dirty="0" smtClean="0"/>
+              <a:t>Development</a:t>
+            </a:r>
+          </a:p>
+          <a:p>
+            <a:pPr lvl="1"/>
+            <a:endParaRPr lang="en-US" dirty="0"/>
+          </a:p>
+          <a:p>
+            <a:pPr lvl="1"/>
+            <a:r>
+              <a:rPr lang="en-US" dirty="0" smtClean="0"/>
+              <a:t>Privacy</a:t>
+            </a:r>
+          </a:p>
+          <a:p>
+            <a:pPr lvl="1"/>
+            <a:endParaRPr lang="en-US" dirty="0"/>
+          </a:p>
+          <a:p>
+            <a:pPr lvl="1"/>
+            <a:r>
+              <a:rPr lang="en-US" dirty="0" smtClean="0"/>
+              <a:t>Design</a:t>
+            </a:r>
+            <a:endParaRPr lang="en-US" dirty="0"/>
+          </a:p>
+        </p:txBody>
+      </p:sp>
+      <p:pic>
+        <p:nvPicPr>
+          <p:cNvPr id="5" name="Picture 4"/>
+          <p:cNvPicPr>
+            <a:picLocks noChangeAspect="1"/>
+          </p:cNvPicPr>
+          <p:nvPr/>
+        </p:nvPicPr>
+        <p:blipFill>
+          <a:blip r:embed="rId2"/>
+          <a:stretch>
+            <a:fillRect/>
+          </a:stretch>
+        </p:blipFill>
+        <p:spPr>
+          <a:xfrm>
+            <a:off x="8737600" y="2989072"/>
+            <a:ext cx="3187700" cy="3187700"/>
+          </a:xfrm>
+          <a:prstGeom prst="rect">
+            <a:avLst/>
+          </a:prstGeom>
+        </p:spPr>
+      </p:pic>
+    </p:spTree>
+    <p:extLst>
+      <p:ext uri="{BB962C8B-B14F-4D97-AF65-F5344CB8AC3E}">
+        <p14:creationId xmlns:p14="http://schemas.microsoft.com/office/powerpoint/2010/main" val="1402458371"/>
+      </p:ext>
+    </p:extLst>
+  </p:cSld>
+  <p:clrMapOvr>
+    <a:masterClrMapping/>
+  </p:clrMapOvr>
+  <mc:AlternateContent xmlns:mc="http://schemas.openxmlformats.org/markup-compatibility/2006" xmlns:p14="http://schemas.microsoft.com/office/powerpoint/2010/main">
+    <mc:Choice Requires="p14">
+      <p:transition spd="med" p14:dur="700">
+        <p:fade/>
+      </p:transition>
+    </mc:Choice>
+    <mc:Fallback xmlns="">
+      <p:transition spd="med">
+        <p:fade/>
+      </p:transition>
+    </mc:Fallback>
+  </mc:AlternateContent>
+</p:sld>
+</file>
+
+<file path=ppt/slides/slide4.xml><?xml version="1.0" encoding="utf-8"?>
+<p:sld xmlns:a="http://schemas.openxmlformats.org/drawingml/2006/main" xmlns:r="http://schemas.openxmlformats.org/officeDocument/2006/relationships" xmlns:p="http://schemas.openxmlformats.org/presentationml/2006/main">
+  <p:cSld>
+    <p:spTree>
+      <p:nvGrpSpPr>
+        <p:cNvPr id="1" name=""/>
+        <p:cNvGrpSpPr/>
+        <p:nvPr/>
+      </p:nvGrpSpPr>
+      <p:grpSpPr>
+        <a:xfrm>
+          <a:off x="0" y="0"/>
+          <a:ext cx="0" cy="0"/>
+          <a:chOff x="0" y="0"/>
+          <a:chExt cx="0" cy="0"/>
+        </a:xfrm>
+      </p:grpSpPr>
+      <p:sp>
+        <p:nvSpPr>
           <p:cNvPr id="4" name="Titel 3">
             <a:extLst>
               <a:ext uri="{FF2B5EF4-FFF2-40B4-BE49-F238E27FC236}">
-                <a16:creationId xmlns:a16="http://schemas.microsoft.com/office/drawing/2014/main" id="{5ADCBB27-4A02-4FE6-B1B3-EBDF20E85236}"/>
+                <a16:creationId xmlns:a16="http://schemas.microsoft.com/office/drawing/2014/main" xmlns="" id="{5ADCBB27-4A02-4FE6-B1B3-EBDF20E85236}"/>
               </a:ext>
             </a:extLst>
           </p:cNvPr>
@@ -4939,7 +5195,7 @@
           <p:cNvPr id="5" name="Textplatzhalter 4">
             <a:extLst>
               <a:ext uri="{FF2B5EF4-FFF2-40B4-BE49-F238E27FC236}">
-                <a16:creationId xmlns:a16="http://schemas.microsoft.com/office/drawing/2014/main" id="{2511E126-4429-475A-915A-4B265D5F381B}"/>
+                <a16:creationId xmlns:a16="http://schemas.microsoft.com/office/drawing/2014/main" xmlns="" id="{2511E126-4429-475A-915A-4B265D5F381B}"/>
               </a:ext>
             </a:extLst>
           </p:cNvPr>

</xml_diff>

<commit_message>
update ppp with Architecture
</commit_message>
<xml_diff>
--- a/doc/task02/Presentation_2.pptx
+++ b/doc/task02/Presentation_2.pptx
@@ -5,16 +5,17 @@
     <p:sldMasterId id="2147483648" r:id="rId1"/>
   </p:sldMasterIdLst>
   <p:notesMasterIdLst>
-    <p:notesMasterId r:id="rId6"/>
+    <p:notesMasterId r:id="rId7"/>
   </p:notesMasterIdLst>
   <p:handoutMasterIdLst>
-    <p:handoutMasterId r:id="rId7"/>
+    <p:handoutMasterId r:id="rId8"/>
   </p:handoutMasterIdLst>
   <p:sldIdLst>
     <p:sldId id="262" r:id="rId2"/>
     <p:sldId id="289" r:id="rId3"/>
     <p:sldId id="290" r:id="rId4"/>
-    <p:sldId id="285" r:id="rId5"/>
+    <p:sldId id="291" r:id="rId5"/>
+    <p:sldId id="285" r:id="rId6"/>
   </p:sldIdLst>
   <p:sldSz cx="12192000" cy="6858000"/>
   <p:notesSz cx="6858000" cy="9144000"/>
@@ -219,7 +220,7 @@
             <a:pPr rtl="0"/>
             <a:fld id="{960672BD-261C-4EDC-9C5E-C246835120E7}" type="datetime1">
               <a:rPr lang="de-DE" smtClean="0"/>
-              <a:t>15.04.18</a:t>
+              <a:t>15.04.2018</a:t>
             </a:fld>
             <a:endParaRPr lang="de-DE" dirty="0"/>
           </a:p>
@@ -389,7 +390,7 @@
             <a:pPr rtl="0"/>
             <a:fld id="{6B5664F4-ABD2-4F09-9758-D36145E15169}" type="datetime1">
               <a:rPr lang="de-DE" smtClean="0"/>
-              <a:t>15.04.18</a:t>
+              <a:t>15.04.2018</a:t>
             </a:fld>
             <a:endParaRPr lang="de-DE" dirty="0"/>
           </a:p>
@@ -830,6 +831,297 @@
 </p:notes>
 </file>
 
+<file path=ppt/notesSlides/notesSlide3.xml><?xml version="1.0" encoding="utf-8"?>
+<p:notes xmlns:a="http://schemas.openxmlformats.org/drawingml/2006/main" xmlns:r="http://schemas.openxmlformats.org/officeDocument/2006/relationships" xmlns:p="http://schemas.openxmlformats.org/presentationml/2006/main">
+  <p:cSld>
+    <p:spTree>
+      <p:nvGrpSpPr>
+        <p:cNvPr id="1" name=""/>
+        <p:cNvGrpSpPr/>
+        <p:nvPr/>
+      </p:nvGrpSpPr>
+      <p:grpSpPr>
+        <a:xfrm>
+          <a:off x="0" y="0"/>
+          <a:ext cx="0" cy="0"/>
+          <a:chOff x="0" y="0"/>
+          <a:chExt cx="0" cy="0"/>
+        </a:xfrm>
+      </p:grpSpPr>
+      <p:sp>
+        <p:nvSpPr>
+          <p:cNvPr id="2" name="Slide Image Placeholder 1"/>
+          <p:cNvSpPr>
+            <a:spLocks noGrp="1" noRot="1" noChangeAspect="1"/>
+          </p:cNvSpPr>
+          <p:nvPr>
+            <p:ph type="sldImg"/>
+          </p:nvPr>
+        </p:nvSpPr>
+        <p:spPr/>
+      </p:sp>
+      <p:sp>
+        <p:nvSpPr>
+          <p:cNvPr id="3" name="Notes Placeholder 2"/>
+          <p:cNvSpPr>
+            <a:spLocks noGrp="1"/>
+          </p:cNvSpPr>
+          <p:nvPr>
+            <p:ph type="body" idx="1"/>
+          </p:nvPr>
+        </p:nvSpPr>
+        <p:spPr/>
+        <p:txBody>
+          <a:bodyPr/>
+          <a:lstStyle/>
+          <a:p>
+            <a:r>
+              <a:rPr lang="de-CH" sz="1200" kern="1200" dirty="0" smtClean="0">
+                <a:solidFill>
+                  <a:schemeClr val="tx1"/>
+                </a:solidFill>
+                <a:effectLst/>
+                <a:latin typeface="+mn-lt"/>
+                <a:ea typeface="+mn-ea"/>
+                <a:cs typeface="+mn-cs"/>
+              </a:rPr>
+              <a:t>Die Applikation wird als Webapplikation umgesetzt. Wir unterscheiden zwischen Backend und Frontend der Applikation.</a:t>
+            </a:r>
+            <a:endParaRPr lang="en-US" sz="1200" kern="1200" dirty="0" smtClean="0">
+              <a:solidFill>
+                <a:schemeClr val="tx1"/>
+              </a:solidFill>
+              <a:effectLst/>
+              <a:latin typeface="+mn-lt"/>
+              <a:ea typeface="+mn-ea"/>
+              <a:cs typeface="+mn-cs"/>
+            </a:endParaRPr>
+          </a:p>
+          <a:p>
+            <a:r>
+              <a:rPr lang="de-CH" sz="1200" b="1" i="1" kern="1200" dirty="0" smtClean="0">
+                <a:solidFill>
+                  <a:schemeClr val="tx1"/>
+                </a:solidFill>
+                <a:effectLst/>
+                <a:latin typeface="+mn-lt"/>
+                <a:ea typeface="+mn-ea"/>
+                <a:cs typeface="+mn-cs"/>
+              </a:rPr>
+              <a:t>Backend</a:t>
+            </a:r>
+            <a:endParaRPr lang="en-US" sz="1200" b="1" i="1" kern="1200" dirty="0" smtClean="0">
+              <a:solidFill>
+                <a:schemeClr val="tx1"/>
+              </a:solidFill>
+              <a:effectLst/>
+              <a:latin typeface="+mn-lt"/>
+              <a:ea typeface="+mn-ea"/>
+              <a:cs typeface="+mn-cs"/>
+            </a:endParaRPr>
+          </a:p>
+          <a:p>
+            <a:r>
+              <a:rPr lang="de-CH" sz="1200" kern="1200" dirty="0" smtClean="0">
+                <a:solidFill>
+                  <a:schemeClr val="tx1"/>
+                </a:solidFill>
+                <a:effectLst/>
+                <a:latin typeface="+mn-lt"/>
+                <a:ea typeface="+mn-ea"/>
+                <a:cs typeface="+mn-cs"/>
+              </a:rPr>
+              <a:t>Die Appliaktion wird auf einem Server in der Cloud installiert.</a:t>
+            </a:r>
+            <a:endParaRPr lang="en-US" sz="1200" kern="1200" dirty="0" smtClean="0">
+              <a:solidFill>
+                <a:schemeClr val="tx1"/>
+              </a:solidFill>
+              <a:effectLst/>
+              <a:latin typeface="+mn-lt"/>
+              <a:ea typeface="+mn-ea"/>
+              <a:cs typeface="+mn-cs"/>
+            </a:endParaRPr>
+          </a:p>
+          <a:p>
+            <a:r>
+              <a:rPr lang="de-CH" sz="1200" kern="1200" dirty="0" smtClean="0">
+                <a:solidFill>
+                  <a:schemeClr val="tx1"/>
+                </a:solidFill>
+                <a:effectLst/>
+                <a:latin typeface="+mn-lt"/>
+                <a:ea typeface="+mn-ea"/>
+                <a:cs typeface="+mn-cs"/>
+              </a:rPr>
+              <a:t>Die Datenverarbeitung und auswertung findet auf dem Server statt. </a:t>
+            </a:r>
+          </a:p>
+          <a:p>
+            <a:r>
+              <a:rPr lang="de-CH" sz="1200" kern="1200" dirty="0" smtClean="0">
+                <a:solidFill>
+                  <a:schemeClr val="tx1"/>
+                </a:solidFill>
+                <a:effectLst/>
+                <a:latin typeface="+mn-lt"/>
+                <a:ea typeface="+mn-ea"/>
+                <a:cs typeface="+mn-cs"/>
+              </a:rPr>
+              <a:t>Die Daten werden in einer Datenbank gespeichert auf welche die Applikation zugriff hat. Die Programm Logik wird in Java umgesetzt. </a:t>
+            </a:r>
+          </a:p>
+          <a:p>
+            <a:r>
+              <a:rPr lang="de-CH" sz="1200" kern="1200" dirty="0" smtClean="0">
+                <a:solidFill>
+                  <a:schemeClr val="tx1"/>
+                </a:solidFill>
+                <a:effectLst/>
+                <a:latin typeface="+mn-lt"/>
+                <a:ea typeface="+mn-ea"/>
+                <a:cs typeface="+mn-cs"/>
+              </a:rPr>
+              <a:t>Die Wartung der Appliaktion und des Servers wird von uns übernommen. Dementsprechend hat der Client kein Aufwand im bereich Wartung und Backup.</a:t>
+            </a:r>
+            <a:endParaRPr lang="en-US" sz="1200" kern="1200" dirty="0" smtClean="0">
+              <a:solidFill>
+                <a:schemeClr val="tx1"/>
+              </a:solidFill>
+              <a:effectLst/>
+              <a:latin typeface="+mn-lt"/>
+              <a:ea typeface="+mn-ea"/>
+              <a:cs typeface="+mn-cs"/>
+            </a:endParaRPr>
+          </a:p>
+          <a:p>
+            <a:r>
+              <a:rPr lang="de-CH" sz="1200" b="1" i="1" kern="1200" dirty="0" smtClean="0">
+                <a:solidFill>
+                  <a:schemeClr val="tx1"/>
+                </a:solidFill>
+                <a:effectLst/>
+                <a:latin typeface="+mn-lt"/>
+                <a:ea typeface="+mn-ea"/>
+                <a:cs typeface="+mn-cs"/>
+              </a:rPr>
+              <a:t>Frontend</a:t>
+            </a:r>
+            <a:endParaRPr lang="en-US" sz="1200" b="1" i="1" kern="1200" dirty="0" smtClean="0">
+              <a:solidFill>
+                <a:schemeClr val="tx1"/>
+              </a:solidFill>
+              <a:effectLst/>
+              <a:latin typeface="+mn-lt"/>
+              <a:ea typeface="+mn-ea"/>
+              <a:cs typeface="+mn-cs"/>
+            </a:endParaRPr>
+          </a:p>
+          <a:p>
+            <a:r>
+              <a:rPr lang="de-CH" sz="1200" kern="1200" dirty="0" smtClean="0">
+                <a:solidFill>
+                  <a:schemeClr val="tx1"/>
+                </a:solidFill>
+                <a:effectLst/>
+                <a:latin typeface="+mn-lt"/>
+                <a:ea typeface="+mn-ea"/>
+                <a:cs typeface="+mn-cs"/>
+              </a:rPr>
+              <a:t>Die Webapplikation ist via Webbrowser aufrubar.</a:t>
+            </a:r>
+            <a:endParaRPr lang="en-US" sz="1200" kern="1200" dirty="0" smtClean="0">
+              <a:solidFill>
+                <a:schemeClr val="tx1"/>
+              </a:solidFill>
+              <a:effectLst/>
+              <a:latin typeface="+mn-lt"/>
+              <a:ea typeface="+mn-ea"/>
+              <a:cs typeface="+mn-cs"/>
+            </a:endParaRPr>
+          </a:p>
+          <a:p>
+            <a:r>
+              <a:rPr lang="de-CH" sz="1200" kern="1200" dirty="0" smtClean="0">
+                <a:solidFill>
+                  <a:schemeClr val="tx1"/>
+                </a:solidFill>
+                <a:effectLst/>
+                <a:latin typeface="+mn-lt"/>
+                <a:ea typeface="+mn-ea"/>
+                <a:cs typeface="+mn-cs"/>
+              </a:rPr>
+              <a:t>Nach einem erfolgreichem Login werden hier die Daten angezeigt und können bearbeitet werden. </a:t>
+            </a:r>
+          </a:p>
+          <a:p>
+            <a:r>
+              <a:rPr lang="de-CH" sz="1200" kern="1200" dirty="0" smtClean="0">
+                <a:solidFill>
+                  <a:schemeClr val="tx1"/>
+                </a:solidFill>
+                <a:effectLst/>
+                <a:latin typeface="+mn-lt"/>
+                <a:ea typeface="+mn-ea"/>
+                <a:cs typeface="+mn-cs"/>
+              </a:rPr>
+              <a:t>Es wird keine lokale Installation benötigt, der Client braucht nur einen moderen Webbrowser. </a:t>
+            </a:r>
+          </a:p>
+          <a:p>
+            <a:r>
+              <a:rPr lang="de-CH" sz="1200" kern="1200" dirty="0" smtClean="0">
+                <a:solidFill>
+                  <a:schemeClr val="tx1"/>
+                </a:solidFill>
+                <a:effectLst/>
+                <a:latin typeface="+mn-lt"/>
+                <a:ea typeface="+mn-ea"/>
+                <a:cs typeface="+mn-cs"/>
+              </a:rPr>
+              <a:t>Dies hat den vorteil, dass auch mobile Geräte auf die Webaplikation zugreifen können. Voraussetzung ist ein Responsive Design der Webapplikation, damit auf allen Geräten auch alles optimal dargestellt wird.</a:t>
+            </a:r>
+            <a:endParaRPr lang="en-US" dirty="0"/>
+          </a:p>
+        </p:txBody>
+      </p:sp>
+      <p:sp>
+        <p:nvSpPr>
+          <p:cNvPr id="4" name="Slide Number Placeholder 3"/>
+          <p:cNvSpPr>
+            <a:spLocks noGrp="1"/>
+          </p:cNvSpPr>
+          <p:nvPr>
+            <p:ph type="sldNum" sz="quarter" idx="10"/>
+          </p:nvPr>
+        </p:nvSpPr>
+        <p:spPr/>
+        <p:txBody>
+          <a:bodyPr/>
+          <a:lstStyle/>
+          <a:p>
+            <a:pPr rtl="0"/>
+            <a:fld id="{FC8BD8E7-1312-41F3-99C4-6DA5AF891969}" type="slidenum">
+              <a:rPr lang="de-DE" smtClean="0"/>
+              <a:t>4</a:t>
+            </a:fld>
+            <a:endParaRPr lang="de-DE" dirty="0"/>
+          </a:p>
+        </p:txBody>
+      </p:sp>
+    </p:spTree>
+    <p:extLst>
+      <p:ext uri="{BB962C8B-B14F-4D97-AF65-F5344CB8AC3E}">
+        <p14:creationId xmlns:p14="http://schemas.microsoft.com/office/powerpoint/2010/main" val="783528665"/>
+      </p:ext>
+    </p:extLst>
+  </p:cSld>
+  <p:clrMapOvr>
+    <a:masterClrMapping/>
+  </p:clrMapOvr>
+</p:notes>
+</file>
+
 <file path=ppt/slideLayouts/slideLayout1.xml><?xml version="1.0" encoding="utf-8"?>
 <p:sldLayout xmlns:a="http://schemas.openxmlformats.org/drawingml/2006/main" xmlns:r="http://schemas.openxmlformats.org/officeDocument/2006/relationships" xmlns:p="http://schemas.openxmlformats.org/presentationml/2006/main" showMasterSp="0" type="title" preserve="1">
   <p:cSld name="Titelfolie">
@@ -1450,7 +1742,7 @@
             <a:pPr rtl="0"/>
             <a:fld id="{6D86D372-411D-4B4E-9C3F-27EFF2F8BE1E}" type="datetime1">
               <a:rPr lang="de-DE" smtClean="0"/>
-              <a:t>15.04.18</a:t>
+              <a:t>15.04.2018</a:t>
             </a:fld>
             <a:endParaRPr lang="de-DE" dirty="0"/>
           </a:p>
@@ -1657,7 +1949,7 @@
             <a:pPr rtl="0"/>
             <a:fld id="{E326EB1D-CBBF-438D-A188-239583155CD5}" type="datetime1">
               <a:rPr lang="de-DE" smtClean="0"/>
-              <a:t>15.04.18</a:t>
+              <a:t>15.04.2018</a:t>
             </a:fld>
             <a:endParaRPr lang="de-DE" dirty="0"/>
           </a:p>
@@ -2267,7 +2559,7 @@
             <a:pPr rtl="0"/>
             <a:fld id="{0158FB9A-9055-4D91-A8D6-422B1A47ADD6}" type="datetime1">
               <a:rPr lang="de-DE" smtClean="0"/>
-              <a:t>15.04.18</a:t>
+              <a:t>15.04.2018</a:t>
             </a:fld>
             <a:endParaRPr lang="de-DE" dirty="0"/>
           </a:p>
@@ -2790,7 +3082,7 @@
             <a:pPr rtl="0"/>
             <a:fld id="{F3AD2B2A-001E-4204-A9F7-ADB62FDFB3C2}" type="datetime1">
               <a:rPr lang="de-DE" smtClean="0"/>
-              <a:t>15.04.18</a:t>
+              <a:t>15.04.2018</a:t>
             </a:fld>
             <a:endParaRPr lang="de-DE" dirty="0"/>
           </a:p>
@@ -3248,7 +3540,7 @@
             <a:pPr rtl="0"/>
             <a:fld id="{D0598511-F564-4313-9C85-1BB6BF3D8A32}" type="datetime1">
               <a:rPr lang="de-DE" smtClean="0"/>
-              <a:t>15.04.18</a:t>
+              <a:t>15.04.2018</a:t>
             </a:fld>
             <a:endParaRPr lang="de-DE" dirty="0"/>
           </a:p>
@@ -3386,7 +3678,7 @@
             <a:pPr rtl="0"/>
             <a:fld id="{2E8B8011-CBA9-4FB0-934D-C2F23F0053DB}" type="datetime1">
               <a:rPr lang="de-DE" smtClean="0"/>
-              <a:t>15.04.18</a:t>
+              <a:t>15.04.2018</a:t>
             </a:fld>
             <a:endParaRPr lang="de-DE" dirty="0"/>
           </a:p>
@@ -3732,7 +4024,7 @@
             <a:pPr rtl="0"/>
             <a:fld id="{62C0A95F-FFB2-4410-A448-2C54BE7723F4}" type="datetime1">
               <a:rPr lang="de-DE" smtClean="0"/>
-              <a:t>15.04.18</a:t>
+              <a:t>15.04.2018</a:t>
             </a:fld>
             <a:endParaRPr lang="de-DE" dirty="0"/>
           </a:p>
@@ -4026,7 +4318,7 @@
             <a:pPr rtl="0"/>
             <a:fld id="{8C96ADC6-BDC4-42FB-97FB-DA73ECD9CEE8}" type="datetime1">
               <a:rPr lang="de-DE" smtClean="0"/>
-              <a:t>15.04.18</a:t>
+              <a:t>15.04.2018</a:t>
             </a:fld>
             <a:endParaRPr lang="de-DE" dirty="0"/>
           </a:p>
@@ -4565,7 +4857,7 @@
           <p:cNvPr id="10" name="Bildplatzhalter 9">
             <a:extLst>
               <a:ext uri="{FF2B5EF4-FFF2-40B4-BE49-F238E27FC236}">
-                <a16:creationId xmlns:a16="http://schemas.microsoft.com/office/drawing/2014/main" xmlns="" id="{C29F7C63-F3E3-44C4-851B-F7913AA9706D}"/>
+                <a16:creationId xmlns="" xmlns:a16="http://schemas.microsoft.com/office/drawing/2014/main" id="{C29F7C63-F3E3-44C4-851B-F7913AA9706D}"/>
               </a:ext>
             </a:extLst>
           </p:cNvPr>
@@ -4599,7 +4891,7 @@
           <p:cNvPr id="14" name="Bildplatzhalter 13">
             <a:extLst>
               <a:ext uri="{FF2B5EF4-FFF2-40B4-BE49-F238E27FC236}">
-                <a16:creationId xmlns:a16="http://schemas.microsoft.com/office/drawing/2014/main" xmlns="" id="{A340DC10-DD9A-4562-AAFD-3AD5F391991D}"/>
+                <a16:creationId xmlns="" xmlns:a16="http://schemas.microsoft.com/office/drawing/2014/main" id="{A340DC10-DD9A-4562-AAFD-3AD5F391991D}"/>
               </a:ext>
             </a:extLst>
           </p:cNvPr>
@@ -4633,7 +4925,7 @@
           <p:cNvPr id="18" name="Bildplatzhalter 17">
             <a:extLst>
               <a:ext uri="{FF2B5EF4-FFF2-40B4-BE49-F238E27FC236}">
-                <a16:creationId xmlns:a16="http://schemas.microsoft.com/office/drawing/2014/main" xmlns="" id="{40F64AC5-1EA3-4330-9CA7-B95506CD16D4}"/>
+                <a16:creationId xmlns="" xmlns:a16="http://schemas.microsoft.com/office/drawing/2014/main" id="{40F64AC5-1EA3-4330-9CA7-B95506CD16D4}"/>
               </a:ext>
             </a:extLst>
           </p:cNvPr>
@@ -4732,7 +5024,7 @@
           <p:cNvPr id="18" name="Inhaltsplatzhalter 17">
             <a:extLst>
               <a:ext uri="{FF2B5EF4-FFF2-40B4-BE49-F238E27FC236}">
-                <a16:creationId xmlns:a16="http://schemas.microsoft.com/office/drawing/2014/main" xmlns="" id="{0C719E4D-A698-413D-BA3C-5FAB44B613F4}"/>
+                <a16:creationId xmlns="" xmlns:a16="http://schemas.microsoft.com/office/drawing/2014/main" id="{0C719E4D-A698-413D-BA3C-5FAB44B613F4}"/>
               </a:ext>
             </a:extLst>
           </p:cNvPr>
@@ -5163,10 +5455,202 @@
       </p:grpSpPr>
       <p:sp>
         <p:nvSpPr>
+          <p:cNvPr id="2" name="Title 1"/>
+          <p:cNvSpPr>
+            <a:spLocks noGrp="1"/>
+          </p:cNvSpPr>
+          <p:nvPr>
+            <p:ph type="title"/>
+          </p:nvPr>
+        </p:nvSpPr>
+        <p:spPr/>
+        <p:txBody>
+          <a:bodyPr/>
+          <a:lstStyle/>
+          <a:p>
+            <a:r>
+              <a:rPr lang="en-US" dirty="0" smtClean="0"/>
+              <a:t>System </a:t>
+            </a:r>
+            <a:r>
+              <a:rPr lang="en-US" dirty="0" smtClean="0"/>
+              <a:t>Architecture</a:t>
+            </a:r>
+            <a:endParaRPr lang="en-US" dirty="0"/>
+          </a:p>
+        </p:txBody>
+      </p:sp>
+      <p:sp>
+        <p:nvSpPr>
+          <p:cNvPr id="6" name="Content Placeholder 5"/>
+          <p:cNvSpPr>
+            <a:spLocks noGrp="1"/>
+          </p:cNvSpPr>
+          <p:nvPr>
+            <p:ph sz="half" idx="1"/>
+          </p:nvPr>
+        </p:nvSpPr>
+        <p:spPr/>
+        <p:txBody>
+          <a:bodyPr>
+            <a:normAutofit/>
+          </a:bodyPr>
+          <a:lstStyle/>
+          <a:p>
+            <a:r>
+              <a:rPr lang="de-CH" dirty="0"/>
+              <a:t>Webapplikation </a:t>
+            </a:r>
+            <a:endParaRPr lang="de-CH" dirty="0" smtClean="0"/>
+          </a:p>
+          <a:p>
+            <a:r>
+              <a:rPr lang="de-CH" dirty="0" smtClean="0"/>
+              <a:t>Backend</a:t>
+            </a:r>
+          </a:p>
+          <a:p>
+            <a:pPr lvl="1"/>
+            <a:r>
+              <a:rPr lang="de-CH" dirty="0" smtClean="0"/>
+              <a:t>Applikation / Server</a:t>
+            </a:r>
+          </a:p>
+          <a:p>
+            <a:pPr lvl="1"/>
+            <a:r>
+              <a:rPr lang="de-CH" dirty="0" smtClean="0"/>
+              <a:t>Datenbank</a:t>
+            </a:r>
+          </a:p>
+          <a:p>
+            <a:endParaRPr lang="de-CH" dirty="0"/>
+          </a:p>
+          <a:p>
+            <a:r>
+              <a:rPr lang="de-CH" dirty="0" smtClean="0"/>
+              <a:t>Frontend</a:t>
+            </a:r>
+            <a:endParaRPr lang="de-CH" dirty="0"/>
+          </a:p>
+          <a:p>
+            <a:pPr lvl="1"/>
+            <a:r>
+              <a:rPr lang="de-CH" dirty="0" smtClean="0"/>
+              <a:t>Browser</a:t>
+            </a:r>
+          </a:p>
+          <a:p>
+            <a:pPr lvl="1"/>
+            <a:r>
+              <a:rPr lang="de-CH" dirty="0"/>
+              <a:t>Keine Installation </a:t>
+            </a:r>
+            <a:r>
+              <a:rPr lang="de-CH" dirty="0" smtClean="0"/>
+              <a:t>benötigt</a:t>
+            </a:r>
+          </a:p>
+          <a:p>
+            <a:pPr lvl="1"/>
+            <a:r>
+              <a:rPr lang="de-CH" dirty="0" smtClean="0"/>
+              <a:t>Mobile Geräte</a:t>
+            </a:r>
+          </a:p>
+        </p:txBody>
+      </p:sp>
+      <p:pic>
+        <p:nvPicPr>
+          <p:cNvPr id="1026" name="Picture 2" descr="https://www.bespokesoftwaredevelopment.com/blog/wp-content/uploads/2016/04/Web_Application_Development.jpg"/>
+          <p:cNvPicPr>
+            <a:picLocks noGrp="1" noChangeAspect="1" noChangeArrowheads="1"/>
+          </p:cNvPicPr>
+          <p:nvPr>
+            <p:ph sz="half" idx="2"/>
+          </p:nvPr>
+        </p:nvPicPr>
+        <p:blipFill>
+          <a:blip r:embed="rId3">
+            <a:extLst>
+              <a:ext uri="{28A0092B-C50C-407E-A947-70E740481C1C}">
+                <a14:useLocalDpi xmlns:a14="http://schemas.microsoft.com/office/drawing/2010/main" val="0"/>
+              </a:ext>
+            </a:extLst>
+          </a:blip>
+          <a:srcRect/>
+          <a:stretch>
+            <a:fillRect/>
+          </a:stretch>
+        </p:blipFill>
+        <p:spPr bwMode="auto">
+          <a:xfrm>
+            <a:off x="4471416" y="1714500"/>
+            <a:ext cx="7392582" cy="2752557"/>
+          </a:xfrm>
+          <a:prstGeom prst="rect">
+            <a:avLst/>
+          </a:prstGeom>
+          <a:noFill/>
+          <a:extLst>
+            <a:ext uri="{909E8E84-426E-40DD-AFC4-6F175D3DCCD1}">
+              <a14:hiddenFill xmlns:a14="http://schemas.microsoft.com/office/drawing/2010/main">
+                <a:solidFill>
+                  <a:srgbClr val="FFFFFF"/>
+                </a:solidFill>
+              </a14:hiddenFill>
+            </a:ext>
+          </a:extLst>
+        </p:spPr>
+      </p:pic>
+    </p:spTree>
+    <p:extLst>
+      <p:ext uri="{BB962C8B-B14F-4D97-AF65-F5344CB8AC3E}">
+        <p14:creationId xmlns:p14="http://schemas.microsoft.com/office/powerpoint/2010/main" val="597376345"/>
+      </p:ext>
+    </p:extLst>
+  </p:cSld>
+  <p:clrMapOvr>
+    <a:masterClrMapping/>
+  </p:clrMapOvr>
+  <mc:AlternateContent xmlns:mc="http://schemas.openxmlformats.org/markup-compatibility/2006" xmlns:p14="http://schemas.microsoft.com/office/powerpoint/2010/main">
+    <mc:Choice Requires="p14">
+      <p:transition spd="med" p14:dur="700">
+        <p:fade/>
+      </p:transition>
+    </mc:Choice>
+    <mc:Fallback xmlns="">
+      <p:transition spd="med">
+        <p:fade/>
+      </p:transition>
+    </mc:Fallback>
+  </mc:AlternateContent>
+</p:sld>
+</file>
+
+<file path=ppt/slides/slide5.xml><?xml version="1.0" encoding="utf-8"?>
+<p:sld xmlns:a="http://schemas.openxmlformats.org/drawingml/2006/main" xmlns:r="http://schemas.openxmlformats.org/officeDocument/2006/relationships" xmlns:p="http://schemas.openxmlformats.org/presentationml/2006/main">
+  <p:cSld>
+    <p:spTree>
+      <p:nvGrpSpPr>
+        <p:cNvPr id="1" name=""/>
+        <p:cNvGrpSpPr/>
+        <p:nvPr/>
+      </p:nvGrpSpPr>
+      <p:grpSpPr>
+        <a:xfrm>
+          <a:off x="0" y="0"/>
+          <a:ext cx="0" cy="0"/>
+          <a:chOff x="0" y="0"/>
+          <a:chExt cx="0" cy="0"/>
+        </a:xfrm>
+      </p:grpSpPr>
+      <p:sp>
+        <p:nvSpPr>
           <p:cNvPr id="4" name="Titel 3">
             <a:extLst>
               <a:ext uri="{FF2B5EF4-FFF2-40B4-BE49-F238E27FC236}">
-                <a16:creationId xmlns:a16="http://schemas.microsoft.com/office/drawing/2014/main" xmlns="" id="{5ADCBB27-4A02-4FE6-B1B3-EBDF20E85236}"/>
+                <a16:creationId xmlns="" xmlns:a16="http://schemas.microsoft.com/office/drawing/2014/main" id="{5ADCBB27-4A02-4FE6-B1B3-EBDF20E85236}"/>
               </a:ext>
             </a:extLst>
           </p:cNvPr>
@@ -5195,7 +5679,7 @@
           <p:cNvPr id="5" name="Textplatzhalter 4">
             <a:extLst>
               <a:ext uri="{FF2B5EF4-FFF2-40B4-BE49-F238E27FC236}">
-                <a16:creationId xmlns:a16="http://schemas.microsoft.com/office/drawing/2014/main" xmlns="" id="{2511E126-4429-475A-915A-4B265D5F381B}"/>
+                <a16:creationId xmlns="" xmlns:a16="http://schemas.microsoft.com/office/drawing/2014/main" id="{2511E126-4429-475A-915A-4B265D5F381B}"/>
               </a:ext>
             </a:extLst>
           </p:cNvPr>

</xml_diff>

<commit_message>
Added introduction to presentation
</commit_message>
<xml_diff>
--- a/doc/task02/Presentation_2.pptx
+++ b/doc/task02/Presentation_2.pptx
@@ -5,18 +5,19 @@
     <p:sldMasterId id="2147483648" r:id="rId1"/>
   </p:sldMasterIdLst>
   <p:notesMasterIdLst>
-    <p:notesMasterId r:id="rId8"/>
+    <p:notesMasterId r:id="rId9"/>
   </p:notesMasterIdLst>
   <p:handoutMasterIdLst>
-    <p:handoutMasterId r:id="rId9"/>
+    <p:handoutMasterId r:id="rId10"/>
   </p:handoutMasterIdLst>
   <p:sldIdLst>
     <p:sldId id="262" r:id="rId2"/>
     <p:sldId id="289" r:id="rId3"/>
-    <p:sldId id="290" r:id="rId4"/>
-    <p:sldId id="292" r:id="rId5"/>
-    <p:sldId id="291" r:id="rId6"/>
-    <p:sldId id="285" r:id="rId7"/>
+    <p:sldId id="294" r:id="rId4"/>
+    <p:sldId id="290" r:id="rId5"/>
+    <p:sldId id="292" r:id="rId6"/>
+    <p:sldId id="291" r:id="rId7"/>
+    <p:sldId id="285" r:id="rId8"/>
   </p:sldIdLst>
   <p:sldSz cx="12192000" cy="6858000"/>
   <p:notesSz cx="6858000" cy="9144000"/>
@@ -289,7 +290,7 @@
             <a:pPr rtl="0"/>
             <a:fld id="{7798501B-77B5-4365-9881-C6E19A3C1E42}" type="slidenum">
               <a:rPr lang="de-DE" smtClean="0"/>
-              <a:t>‹Nr.›</a:t>
+              <a:t>‹#›</a:t>
             </a:fld>
             <a:endParaRPr lang="de-DE" dirty="0"/>
           </a:p>
@@ -552,7 +553,7 @@
             <a:pPr rtl="0"/>
             <a:fld id="{FC8BD8E7-1312-41F3-99C4-6DA5AF891969}" type="slidenum">
               <a:rPr lang="de-DE" smtClean="0"/>
-              <a:t>‹Nr.›</a:t>
+              <a:t>‹#›</a:t>
             </a:fld>
             <a:endParaRPr lang="de-DE" dirty="0"/>
           </a:p>
@@ -851,7 +852,7 @@
       </p:grpSpPr>
       <p:sp>
         <p:nvSpPr>
-          <p:cNvPr id="2" name="Slide Image Placeholder 1"/>
+          <p:cNvPr id="2" name="Folienbildplatzhalter 1"/>
           <p:cNvSpPr>
             <a:spLocks noGrp="1" noRot="1" noChangeAspect="1"/>
           </p:cNvSpPr>
@@ -863,7 +864,7 @@
       </p:sp>
       <p:sp>
         <p:nvSpPr>
-          <p:cNvPr id="3" name="Notes Placeholder 2"/>
+          <p:cNvPr id="3" name="Notizenplatzhalter 2"/>
           <p:cNvSpPr>
             <a:spLocks noGrp="1"/>
           </p:cNvSpPr>
@@ -876,8 +877,93 @@
           <a:bodyPr/>
           <a:lstStyle/>
           <a:p>
-            <a:r>
-              <a:rPr lang="de-CH" sz="1200" kern="1200" dirty="0" smtClean="0">
+            <a:endParaRPr lang="de-DE" dirty="0"/>
+          </a:p>
+        </p:txBody>
+      </p:sp>
+      <p:sp>
+        <p:nvSpPr>
+          <p:cNvPr id="4" name="Foliennummernplatzhalter 3"/>
+          <p:cNvSpPr>
+            <a:spLocks noGrp="1"/>
+          </p:cNvSpPr>
+          <p:nvPr>
+            <p:ph type="sldNum" sz="quarter" idx="10"/>
+          </p:nvPr>
+        </p:nvSpPr>
+        <p:spPr/>
+        <p:txBody>
+          <a:bodyPr/>
+          <a:lstStyle/>
+          <a:p>
+            <a:pPr rtl="0"/>
+            <a:fld id="{FC8BD8E7-1312-41F3-99C4-6DA5AF891969}" type="slidenum">
+              <a:rPr lang="de-DE" smtClean="0"/>
+              <a:t>3</a:t>
+            </a:fld>
+            <a:endParaRPr lang="de-DE" dirty="0"/>
+          </a:p>
+        </p:txBody>
+      </p:sp>
+    </p:spTree>
+    <p:extLst>
+      <p:ext uri="{BB962C8B-B14F-4D97-AF65-F5344CB8AC3E}">
+        <p14:creationId xmlns:p14="http://schemas.microsoft.com/office/powerpoint/2010/main" val="4262246249"/>
+      </p:ext>
+    </p:extLst>
+  </p:cSld>
+  <p:clrMapOvr>
+    <a:masterClrMapping/>
+  </p:clrMapOvr>
+</p:notes>
+</file>
+
+<file path=ppt/notesSlides/notesSlide4.xml><?xml version="1.0" encoding="utf-8"?>
+<p:notes xmlns:a="http://schemas.openxmlformats.org/drawingml/2006/main" xmlns:r="http://schemas.openxmlformats.org/officeDocument/2006/relationships" xmlns:p="http://schemas.openxmlformats.org/presentationml/2006/main">
+  <p:cSld>
+    <p:spTree>
+      <p:nvGrpSpPr>
+        <p:cNvPr id="1" name=""/>
+        <p:cNvGrpSpPr/>
+        <p:nvPr/>
+      </p:nvGrpSpPr>
+      <p:grpSpPr>
+        <a:xfrm>
+          <a:off x="0" y="0"/>
+          <a:ext cx="0" cy="0"/>
+          <a:chOff x="0" y="0"/>
+          <a:chExt cx="0" cy="0"/>
+        </a:xfrm>
+      </p:grpSpPr>
+      <p:sp>
+        <p:nvSpPr>
+          <p:cNvPr id="2" name="Slide Image Placeholder 1"/>
+          <p:cNvSpPr>
+            <a:spLocks noGrp="1" noRot="1" noChangeAspect="1"/>
+          </p:cNvSpPr>
+          <p:nvPr>
+            <p:ph type="sldImg"/>
+          </p:nvPr>
+        </p:nvSpPr>
+        <p:spPr/>
+      </p:sp>
+      <p:sp>
+        <p:nvSpPr>
+          <p:cNvPr id="3" name="Notes Placeholder 2"/>
+          <p:cNvSpPr>
+            <a:spLocks noGrp="1"/>
+          </p:cNvSpPr>
+          <p:nvPr>
+            <p:ph type="body" idx="1"/>
+          </p:nvPr>
+        </p:nvSpPr>
+        <p:spPr/>
+        <p:txBody>
+          <a:bodyPr/>
+          <a:lstStyle/>
+          <a:p>
+            <a:r>
+              <a:rPr lang="de-CH" sz="1200" kern="1200" dirty="0">
                 <a:solidFill>
                   <a:schemeClr val="tx1"/>
                 </a:solidFill>
@@ -888,7 +974,7 @@
               </a:rPr>
               <a:t>Die Applikation wird als Webapplikation umgesetzt. Wir unterscheiden zwischen Backend und Frontend der Applikation.</a:t>
             </a:r>
-            <a:endParaRPr lang="en-US" sz="1200" kern="1200" dirty="0" smtClean="0">
+            <a:endParaRPr lang="en-US" sz="1200" kern="1200" dirty="0">
               <a:solidFill>
                 <a:schemeClr val="tx1"/>
               </a:solidFill>
@@ -900,7 +986,7 @@
           </a:p>
           <a:p>
             <a:r>
-              <a:rPr lang="de-CH" sz="1200" b="1" i="1" kern="1200" dirty="0" smtClean="0">
+              <a:rPr lang="de-CH" sz="1200" b="1" i="1" kern="1200" dirty="0">
                 <a:solidFill>
                   <a:schemeClr val="tx1"/>
                 </a:solidFill>
@@ -911,7 +997,7 @@
               </a:rPr>
               <a:t>Backend</a:t>
             </a:r>
-            <a:endParaRPr lang="en-US" sz="1200" b="1" i="1" kern="1200" dirty="0" smtClean="0">
+            <a:endParaRPr lang="en-US" sz="1200" b="1" i="1" kern="1200" dirty="0">
               <a:solidFill>
                 <a:schemeClr val="tx1"/>
               </a:solidFill>
@@ -923,7 +1009,7 @@
           </a:p>
           <a:p>
             <a:r>
-              <a:rPr lang="de-CH" sz="1200" kern="1200" dirty="0" smtClean="0">
+              <a:rPr lang="de-CH" sz="1200" kern="1200" dirty="0">
                 <a:solidFill>
                   <a:schemeClr val="tx1"/>
                 </a:solidFill>
@@ -934,7 +1020,7 @@
               </a:rPr>
               <a:t>Die Appliaktion wird auf einem Server in der Cloud installiert.</a:t>
             </a:r>
-            <a:endParaRPr lang="en-US" sz="1200" kern="1200" dirty="0" smtClean="0">
+            <a:endParaRPr lang="en-US" sz="1200" kern="1200" dirty="0">
               <a:solidFill>
                 <a:schemeClr val="tx1"/>
               </a:solidFill>
@@ -946,7 +1032,7 @@
           </a:p>
           <a:p>
             <a:r>
-              <a:rPr lang="de-CH" sz="1200" kern="1200" dirty="0" smtClean="0">
+              <a:rPr lang="de-CH" sz="1200" kern="1200" dirty="0">
                 <a:solidFill>
                   <a:schemeClr val="tx1"/>
                 </a:solidFill>
@@ -960,7 +1046,7 @@
           </a:p>
           <a:p>
             <a:r>
-              <a:rPr lang="de-CH" sz="1200" kern="1200" dirty="0" smtClean="0">
+              <a:rPr lang="de-CH" sz="1200" kern="1200" dirty="0">
                 <a:solidFill>
                   <a:schemeClr val="tx1"/>
                 </a:solidFill>
@@ -974,7 +1060,7 @@
           </a:p>
           <a:p>
             <a:r>
-              <a:rPr lang="de-CH" sz="1200" kern="1200" dirty="0" smtClean="0">
+              <a:rPr lang="de-CH" sz="1200" kern="1200" dirty="0">
                 <a:solidFill>
                   <a:schemeClr val="tx1"/>
                 </a:solidFill>
@@ -985,7 +1071,7 @@
               </a:rPr>
               <a:t>Die Wartung der Appliaktion und des Servers wird von uns übernommen. Dementsprechend hat der Client kein Aufwand im bereich Wartung und Backup.</a:t>
             </a:r>
-            <a:endParaRPr lang="en-US" sz="1200" kern="1200" dirty="0" smtClean="0">
+            <a:endParaRPr lang="en-US" sz="1200" kern="1200" dirty="0">
               <a:solidFill>
                 <a:schemeClr val="tx1"/>
               </a:solidFill>
@@ -997,7 +1083,7 @@
           </a:p>
           <a:p>
             <a:r>
-              <a:rPr lang="de-CH" sz="1200" b="1" i="1" kern="1200" dirty="0" smtClean="0">
+              <a:rPr lang="de-CH" sz="1200" b="1" i="1" kern="1200" dirty="0">
                 <a:solidFill>
                   <a:schemeClr val="tx1"/>
                 </a:solidFill>
@@ -1008,7 +1094,7 @@
               </a:rPr>
               <a:t>Frontend</a:t>
             </a:r>
-            <a:endParaRPr lang="en-US" sz="1200" b="1" i="1" kern="1200" dirty="0" smtClean="0">
+            <a:endParaRPr lang="en-US" sz="1200" b="1" i="1" kern="1200" dirty="0">
               <a:solidFill>
                 <a:schemeClr val="tx1"/>
               </a:solidFill>
@@ -1020,7 +1106,7 @@
           </a:p>
           <a:p>
             <a:r>
-              <a:rPr lang="de-CH" sz="1200" kern="1200" dirty="0" smtClean="0">
+              <a:rPr lang="de-CH" sz="1200" kern="1200" dirty="0">
                 <a:solidFill>
                   <a:schemeClr val="tx1"/>
                 </a:solidFill>
@@ -1031,7 +1117,7 @@
               </a:rPr>
               <a:t>Die Webapplikation ist via Webbrowser aufrubar.</a:t>
             </a:r>
-            <a:endParaRPr lang="en-US" sz="1200" kern="1200" dirty="0" smtClean="0">
+            <a:endParaRPr lang="en-US" sz="1200" kern="1200" dirty="0">
               <a:solidFill>
                 <a:schemeClr val="tx1"/>
               </a:solidFill>
@@ -1043,7 +1129,7 @@
           </a:p>
           <a:p>
             <a:r>
-              <a:rPr lang="de-CH" sz="1200" kern="1200" dirty="0" smtClean="0">
+              <a:rPr lang="de-CH" sz="1200" kern="1200" dirty="0">
                 <a:solidFill>
                   <a:schemeClr val="tx1"/>
                 </a:solidFill>
@@ -1057,7 +1143,7 @@
           </a:p>
           <a:p>
             <a:r>
-              <a:rPr lang="de-CH" sz="1200" kern="1200" dirty="0" smtClean="0">
+              <a:rPr lang="de-CH" sz="1200" kern="1200" dirty="0">
                 <a:solidFill>
                   <a:schemeClr val="tx1"/>
                 </a:solidFill>
@@ -1071,7 +1157,7 @@
           </a:p>
           <a:p>
             <a:r>
-              <a:rPr lang="de-CH" sz="1200" kern="1200" dirty="0" smtClean="0">
+              <a:rPr lang="de-CH" sz="1200" kern="1200" dirty="0">
                 <a:solidFill>
                   <a:schemeClr val="tx1"/>
                 </a:solidFill>
@@ -1104,7 +1190,7 @@
             <a:pPr rtl="0"/>
             <a:fld id="{FC8BD8E7-1312-41F3-99C4-6DA5AF891969}" type="slidenum">
               <a:rPr lang="de-DE" smtClean="0"/>
-              <a:t>5</a:t>
+              <a:t>6</a:t>
             </a:fld>
             <a:endParaRPr lang="de-DE" dirty="0"/>
           </a:p>
@@ -1767,7 +1853,7 @@
             <a:pPr rtl="0"/>
             <a:fld id="{E31375A4-56A4-47D6-9801-1991572033F7}" type="slidenum">
               <a:rPr lang="de-DE" smtClean="0"/>
-              <a:t>‹Nr.›</a:t>
+              <a:t>‹#›</a:t>
             </a:fld>
             <a:endParaRPr lang="de-DE" dirty="0"/>
           </a:p>
@@ -1974,7 +2060,7 @@
             <a:pPr rtl="0"/>
             <a:fld id="{E31375A4-56A4-47D6-9801-1991572033F7}" type="slidenum">
               <a:rPr lang="de-DE" smtClean="0"/>
-              <a:t>‹Nr.›</a:t>
+              <a:t>‹#›</a:t>
             </a:fld>
             <a:endParaRPr lang="de-DE" dirty="0"/>
           </a:p>
@@ -2584,7 +2670,7 @@
             <a:pPr rtl="0"/>
             <a:fld id="{E31375A4-56A4-47D6-9801-1991572033F7}" type="slidenum">
               <a:rPr lang="de-DE" smtClean="0"/>
-              <a:t>‹Nr.›</a:t>
+              <a:t>‹#›</a:t>
             </a:fld>
             <a:endParaRPr lang="de-DE" dirty="0"/>
           </a:p>
@@ -3107,7 +3193,7 @@
             <a:pPr rtl="0"/>
             <a:fld id="{E31375A4-56A4-47D6-9801-1991572033F7}" type="slidenum">
               <a:rPr lang="de-DE" smtClean="0"/>
-              <a:t>‹Nr.›</a:t>
+              <a:t>‹#›</a:t>
             </a:fld>
             <a:endParaRPr lang="de-DE" dirty="0"/>
           </a:p>
@@ -3565,7 +3651,7 @@
             <a:pPr rtl="0"/>
             <a:fld id="{E31375A4-56A4-47D6-9801-1991572033F7}" type="slidenum">
               <a:rPr lang="de-DE" smtClean="0"/>
-              <a:t>‹Nr.›</a:t>
+              <a:t>‹#›</a:t>
             </a:fld>
             <a:endParaRPr lang="de-DE" dirty="0"/>
           </a:p>
@@ -3703,7 +3789,7 @@
             <a:pPr rtl="0"/>
             <a:fld id="{E31375A4-56A4-47D6-9801-1991572033F7}" type="slidenum">
               <a:rPr lang="de-DE" smtClean="0"/>
-              <a:t>‹Nr.›</a:t>
+              <a:t>‹#›</a:t>
             </a:fld>
             <a:endParaRPr lang="de-DE" dirty="0"/>
           </a:p>
@@ -4049,7 +4135,7 @@
             <a:pPr rtl="0"/>
             <a:fld id="{E31375A4-56A4-47D6-9801-1991572033F7}" type="slidenum">
               <a:rPr lang="de-DE" smtClean="0"/>
-              <a:t>‹Nr.›</a:t>
+              <a:t>‹#›</a:t>
             </a:fld>
             <a:endParaRPr lang="de-DE" dirty="0"/>
           </a:p>
@@ -4360,7 +4446,7 @@
             <a:fld id="{E31375A4-56A4-47D6-9801-1991572033F7}" type="slidenum">
               <a:rPr lang="de-DE" smtClean="0"/>
               <a:pPr rtl="0"/>
-              <a:t>‹Nr.›</a:t>
+              <a:t>‹#›</a:t>
             </a:fld>
             <a:endParaRPr lang="de-DE" dirty="0"/>
           </a:p>
@@ -5201,7 +5287,7 @@
       </p:grpSpPr>
       <p:sp>
         <p:nvSpPr>
-          <p:cNvPr id="2" name="Title 1"/>
+          <p:cNvPr id="2" name="Titel 1"/>
           <p:cNvSpPr>
             <a:spLocks noGrp="1"/>
           </p:cNvSpPr>
@@ -5210,15 +5296,154 @@
           </p:nvPr>
         </p:nvSpPr>
         <p:spPr/>
+        <p:txBody>
+          <a:bodyPr rtlCol="0"/>
+          <a:lstStyle/>
+          <a:p>
+            <a:pPr rtl="0"/>
+            <a:r>
+              <a:rPr lang="de-DE" dirty="0" err="1"/>
+              <a:t>Introduction</a:t>
+            </a:r>
+            <a:endParaRPr lang="de-DE" dirty="0"/>
+          </a:p>
+        </p:txBody>
+      </p:sp>
+      <p:sp>
+        <p:nvSpPr>
+          <p:cNvPr id="18" name="Inhaltsplatzhalter 17">
+            <a:extLst>
+              <a:ext uri="{FF2B5EF4-FFF2-40B4-BE49-F238E27FC236}">
+                <a16:creationId xmlns:a16="http://schemas.microsoft.com/office/drawing/2014/main" id="{0C719E4D-A698-413D-BA3C-5FAB44B613F4}"/>
+              </a:ext>
+            </a:extLst>
+          </p:cNvPr>
+          <p:cNvSpPr>
+            <a:spLocks noGrp="1"/>
+          </p:cNvSpPr>
+          <p:nvPr>
+            <p:ph sz="half" idx="1"/>
+          </p:nvPr>
+        </p:nvSpPr>
+        <p:spPr>
+          <a:xfrm>
+            <a:off x="1524000" y="1714500"/>
+            <a:ext cx="7853606" cy="4462272"/>
+          </a:xfrm>
+        </p:spPr>
         <p:txBody>
           <a:bodyPr/>
           <a:lstStyle/>
           <a:p>
-            <a:r>
-              <a:rPr lang="en-US" dirty="0" smtClean="0"/>
+            <a:pPr lvl="1"/>
+            <a:r>
+              <a:rPr lang="en-US" dirty="0" err="1"/>
+              <a:t>Zielgruppe</a:t>
+            </a:r>
+            <a:endParaRPr lang="en-US"/>
+          </a:p>
+          <a:p>
+            <a:pPr lvl="1"/>
+            <a:endParaRPr lang="en-US"/>
+          </a:p>
+          <a:p>
+            <a:pPr lvl="1"/>
+            <a:r>
+              <a:rPr lang="en-US" dirty="0" err="1"/>
+              <a:t>Angehörigen-Tagebuch</a:t>
+            </a:r>
+            <a:endParaRPr lang="en-US" dirty="0"/>
+          </a:p>
+          <a:p>
+            <a:pPr lvl="1"/>
+            <a:endParaRPr lang="en-US" dirty="0"/>
+          </a:p>
+          <a:p>
+            <a:pPr lvl="1"/>
+            <a:r>
+              <a:rPr lang="en-US" dirty="0" err="1"/>
+              <a:t>Patienten-Tagebuch</a:t>
+            </a:r>
+            <a:endParaRPr lang="en-US" dirty="0"/>
+          </a:p>
+          <a:p>
+            <a:pPr lvl="1"/>
+            <a:endParaRPr lang="en-US" dirty="0"/>
+          </a:p>
+          <a:p>
+            <a:pPr lvl="1"/>
+            <a:r>
+              <a:rPr lang="en-US" dirty="0" err="1"/>
+              <a:t>Zielsetzungs</a:t>
+            </a:r>
+            <a:r>
+              <a:rPr lang="en-US" dirty="0"/>
+              <a:t>-System</a:t>
+            </a:r>
+          </a:p>
+        </p:txBody>
+      </p:sp>
+    </p:spTree>
+    <p:extLst>
+      <p:ext uri="{BB962C8B-B14F-4D97-AF65-F5344CB8AC3E}">
+        <p14:creationId xmlns:p14="http://schemas.microsoft.com/office/powerpoint/2010/main" val="3380861153"/>
+      </p:ext>
+    </p:extLst>
+  </p:cSld>
+  <p:clrMapOvr>
+    <a:masterClrMapping/>
+  </p:clrMapOvr>
+  <mc:AlternateContent xmlns:mc="http://schemas.openxmlformats.org/markup-compatibility/2006" xmlns:p14="http://schemas.microsoft.com/office/powerpoint/2010/main">
+    <mc:Choice Requires="p14">
+      <p:transition spd="med" p14:dur="700">
+        <p:fade/>
+      </p:transition>
+    </mc:Choice>
+    <mc:Fallback xmlns="">
+      <p:transition spd="med">
+        <p:fade/>
+      </p:transition>
+    </mc:Fallback>
+  </mc:AlternateContent>
+</p:sld>
+</file>
+
+<file path=ppt/slides/slide4.xml><?xml version="1.0" encoding="utf-8"?>
+<p:sld xmlns:a="http://schemas.openxmlformats.org/drawingml/2006/main" xmlns:r="http://schemas.openxmlformats.org/officeDocument/2006/relationships" xmlns:p="http://schemas.openxmlformats.org/presentationml/2006/main">
+  <p:cSld>
+    <p:spTree>
+      <p:nvGrpSpPr>
+        <p:cNvPr id="1" name=""/>
+        <p:cNvGrpSpPr/>
+        <p:nvPr/>
+      </p:nvGrpSpPr>
+      <p:grpSpPr>
+        <a:xfrm>
+          <a:off x="0" y="0"/>
+          <a:ext cx="0" cy="0"/>
+          <a:chOff x="0" y="0"/>
+          <a:chExt cx="0" cy="0"/>
+        </a:xfrm>
+      </p:grpSpPr>
+      <p:sp>
+        <p:nvSpPr>
+          <p:cNvPr id="2" name="Title 1"/>
+          <p:cNvSpPr>
+            <a:spLocks noGrp="1"/>
+          </p:cNvSpPr>
+          <p:nvPr>
+            <p:ph type="title"/>
+          </p:nvPr>
+        </p:nvSpPr>
+        <p:spPr/>
+        <p:txBody>
+          <a:bodyPr/>
+          <a:lstStyle/>
+          <a:p>
+            <a:r>
+              <a:rPr lang="en-US" dirty="0"/>
               <a:t>System Requirement Specification</a:t>
             </a:r>
-            <a:endParaRPr lang="en-US" dirty="0"/>
           </a:p>
         </p:txBody>
       </p:sp>
@@ -5240,93 +5465,92 @@
           <a:lstStyle/>
           <a:p>
             <a:r>
-              <a:rPr lang="en-US" dirty="0" smtClean="0"/>
+              <a:rPr lang="en-US" dirty="0"/>
               <a:t>Functional Requirements</a:t>
             </a:r>
           </a:p>
           <a:p>
-            <a:endParaRPr lang="en-US" dirty="0" smtClean="0"/>
+            <a:endParaRPr lang="en-US" dirty="0"/>
           </a:p>
           <a:p>
             <a:pPr lvl="1"/>
             <a:r>
-              <a:rPr lang="en-US" dirty="0" err="1" smtClean="0"/>
+              <a:rPr lang="en-US" dirty="0" err="1"/>
               <a:t>Angehörigen-Tagebuch</a:t>
             </a:r>
-            <a:endParaRPr lang="en-US" dirty="0" smtClean="0"/>
+            <a:endParaRPr lang="en-US" dirty="0"/>
           </a:p>
           <a:p>
             <a:pPr lvl="1"/>
-            <a:endParaRPr lang="en-US" dirty="0" smtClean="0"/>
+            <a:endParaRPr lang="en-US" dirty="0"/>
           </a:p>
           <a:p>
             <a:pPr lvl="1"/>
             <a:r>
-              <a:rPr lang="en-US" dirty="0" err="1" smtClean="0"/>
+              <a:rPr lang="en-US" dirty="0" err="1"/>
               <a:t>Patienten-Tagebuch</a:t>
             </a:r>
-            <a:endParaRPr lang="en-US" dirty="0" smtClean="0"/>
+            <a:endParaRPr lang="en-US" dirty="0"/>
           </a:p>
           <a:p>
             <a:pPr lvl="1"/>
-            <a:endParaRPr lang="en-US" dirty="0" smtClean="0"/>
+            <a:endParaRPr lang="en-US" dirty="0"/>
           </a:p>
           <a:p>
             <a:pPr lvl="1"/>
             <a:r>
-              <a:rPr lang="en-US" dirty="0" err="1" smtClean="0"/>
+              <a:rPr lang="en-US" dirty="0" err="1"/>
               <a:t>Zielsetzungs</a:t>
             </a:r>
             <a:r>
-              <a:rPr lang="en-US" dirty="0" smtClean="0"/>
+              <a:rPr lang="en-US" dirty="0"/>
               <a:t>-System</a:t>
             </a:r>
           </a:p>
           <a:p>
             <a:pPr lvl="1"/>
-            <a:endParaRPr lang="en-US" dirty="0" smtClean="0"/>
+            <a:endParaRPr lang="en-US" dirty="0"/>
           </a:p>
           <a:p>
             <a:pPr lvl="1"/>
             <a:r>
-              <a:rPr lang="en-US" dirty="0" err="1" smtClean="0"/>
+              <a:rPr lang="en-US" dirty="0" err="1"/>
               <a:t>Berechtigungssystem</a:t>
             </a:r>
-            <a:endParaRPr lang="en-US" dirty="0" smtClean="0"/>
+            <a:endParaRPr lang="en-US" dirty="0"/>
           </a:p>
           <a:p>
             <a:pPr lvl="1"/>
-            <a:endParaRPr lang="en-US" dirty="0" smtClean="0"/>
+            <a:endParaRPr lang="en-US" dirty="0"/>
           </a:p>
           <a:p>
             <a:pPr lvl="1"/>
             <a:r>
-              <a:rPr lang="en-US" dirty="0" smtClean="0"/>
+              <a:rPr lang="en-US" dirty="0"/>
               <a:t>Responsive Design</a:t>
             </a:r>
           </a:p>
           <a:p>
             <a:pPr lvl="1"/>
-            <a:endParaRPr lang="en-US" dirty="0" smtClean="0"/>
+            <a:endParaRPr lang="en-US" dirty="0"/>
           </a:p>
           <a:p>
             <a:pPr lvl="1"/>
             <a:r>
-              <a:rPr lang="en-US" dirty="0" smtClean="0"/>
+              <a:rPr lang="en-US" dirty="0"/>
               <a:t>Data Store</a:t>
             </a:r>
           </a:p>
           <a:p>
             <a:pPr lvl="1"/>
-            <a:endParaRPr lang="en-US" dirty="0" smtClean="0"/>
+            <a:endParaRPr lang="en-US" dirty="0"/>
           </a:p>
           <a:p>
             <a:pPr lvl="1"/>
             <a:r>
-              <a:rPr lang="en-US" dirty="0" smtClean="0"/>
+              <a:rPr lang="en-US" dirty="0"/>
               <a:t>Development</a:t>
             </a:r>
-            <a:endParaRPr lang="en-US" dirty="0"/>
           </a:p>
         </p:txBody>
       </p:sp>
@@ -5348,19 +5572,8 @@
           <a:lstStyle/>
           <a:p>
             <a:r>
-              <a:rPr lang="en-US" dirty="0" smtClean="0"/>
+              <a:rPr lang="en-US" dirty="0"/>
               <a:t>Non-Functional Requirements</a:t>
-            </a:r>
-          </a:p>
-          <a:p>
-            <a:pPr lvl="1"/>
-            <a:endParaRPr lang="en-US" dirty="0" smtClean="0"/>
-          </a:p>
-          <a:p>
-            <a:pPr lvl="1"/>
-            <a:r>
-              <a:rPr lang="en-US" dirty="0" smtClean="0"/>
-              <a:t>Development</a:t>
             </a:r>
           </a:p>
           <a:p>
@@ -5370,8 +5583,8 @@
           <a:p>
             <a:pPr lvl="1"/>
             <a:r>
-              <a:rPr lang="en-US" dirty="0" smtClean="0"/>
-              <a:t>Privacy</a:t>
+              <a:rPr lang="en-US" dirty="0"/>
+              <a:t>Development</a:t>
             </a:r>
           </a:p>
           <a:p>
@@ -5381,10 +5594,20 @@
           <a:p>
             <a:pPr lvl="1"/>
             <a:r>
-              <a:rPr lang="en-US" dirty="0" smtClean="0"/>
+              <a:rPr lang="en-US" dirty="0"/>
+              <a:t>Privacy</a:t>
+            </a:r>
+          </a:p>
+          <a:p>
+            <a:pPr lvl="1"/>
+            <a:endParaRPr lang="en-US" dirty="0"/>
+          </a:p>
+          <a:p>
+            <a:pPr lvl="1"/>
+            <a:r>
+              <a:rPr lang="en-US" dirty="0"/>
               <a:t>Design</a:t>
             </a:r>
-            <a:endParaRPr lang="en-US" dirty="0"/>
           </a:p>
         </p:txBody>
       </p:sp>
@@ -5437,7 +5660,7 @@
 </p:sld>
 </file>
 
-<file path=ppt/slides/slide4.xml><?xml version="1.0" encoding="utf-8"?>
+<file path=ppt/slides/slide5.xml><?xml version="1.0" encoding="utf-8"?>
 <p:sld xmlns:a="http://schemas.openxmlformats.org/drawingml/2006/main" xmlns:r="http://schemas.openxmlformats.org/officeDocument/2006/relationships" xmlns:p="http://schemas.openxmlformats.org/presentationml/2006/main">
   <p:cSld>
     <p:spTree>
@@ -5470,10 +5693,9 @@
           <a:lstStyle/>
           <a:p>
             <a:r>
-              <a:rPr lang="de-CH" dirty="0" smtClean="0"/>
+              <a:rPr lang="de-CH" dirty="0"/>
               <a:t>System Model</a:t>
             </a:r>
-            <a:endParaRPr lang="de-CH" dirty="0"/>
           </a:p>
         </p:txBody>
       </p:sp>
@@ -5535,7 +5757,7 @@
 </p:sld>
 </file>
 
-<file path=ppt/slides/slide5.xml><?xml version="1.0" encoding="utf-8"?>
+<file path=ppt/slides/slide6.xml><?xml version="1.0" encoding="utf-8"?>
 <p:sld xmlns:a="http://schemas.openxmlformats.org/drawingml/2006/main" xmlns:r="http://schemas.openxmlformats.org/officeDocument/2006/relationships" xmlns:p="http://schemas.openxmlformats.org/presentationml/2006/main">
   <p:cSld>
     <p:spTree>
@@ -5568,10 +5790,9 @@
           <a:lstStyle/>
           <a:p>
             <a:r>
-              <a:rPr lang="en-US" dirty="0" smtClean="0"/>
+              <a:rPr lang="en-US" dirty="0"/>
               <a:t>System Architecture</a:t>
             </a:r>
-            <a:endParaRPr lang="en-US" dirty="0"/>
           </a:p>
         </p:txBody>
       </p:sp>
@@ -5596,25 +5817,24 @@
               <a:rPr lang="de-CH" dirty="0"/>
               <a:t>Webapplikation </a:t>
             </a:r>
-            <a:endParaRPr lang="de-CH" dirty="0" smtClean="0"/>
-          </a:p>
-          <a:p>
-            <a:r>
-              <a:rPr lang="de-CH" dirty="0" smtClean="0"/>
+          </a:p>
+          <a:p>
+            <a:r>
+              <a:rPr lang="de-CH" dirty="0"/>
               <a:t>Backend</a:t>
             </a:r>
           </a:p>
           <a:p>
             <a:pPr lvl="1"/>
             <a:r>
-              <a:rPr lang="de-CH" dirty="0" smtClean="0"/>
+              <a:rPr lang="de-CH" dirty="0"/>
               <a:t>Applikation / Server</a:t>
             </a:r>
           </a:p>
           <a:p>
             <a:pPr lvl="1"/>
             <a:r>
-              <a:rPr lang="de-CH" dirty="0" smtClean="0"/>
+              <a:rPr lang="de-CH" dirty="0"/>
               <a:t>Datenbank</a:t>
             </a:r>
           </a:p>
@@ -5623,15 +5843,14 @@
           </a:p>
           <a:p>
             <a:r>
-              <a:rPr lang="de-CH" dirty="0" smtClean="0"/>
+              <a:rPr lang="de-CH" dirty="0"/>
               <a:t>Frontend</a:t>
             </a:r>
-            <a:endParaRPr lang="de-CH" dirty="0"/>
           </a:p>
           <a:p>
             <a:pPr lvl="1"/>
             <a:r>
-              <a:rPr lang="de-CH" dirty="0" smtClean="0"/>
+              <a:rPr lang="de-CH" dirty="0"/>
               <a:t>Browser</a:t>
             </a:r>
           </a:p>
@@ -5639,17 +5858,13 @@
             <a:pPr lvl="1"/>
             <a:r>
               <a:rPr lang="de-CH" dirty="0"/>
-              <a:t>Keine Installation </a:t>
-            </a:r>
-            <a:r>
-              <a:rPr lang="de-CH" dirty="0" smtClean="0"/>
-              <a:t>benötigt</a:t>
+              <a:t>Keine Installation benötigt</a:t>
             </a:r>
           </a:p>
           <a:p>
             <a:pPr lvl="1"/>
             <a:r>
-              <a:rPr lang="de-CH" dirty="0" smtClean="0"/>
+              <a:rPr lang="de-CH" dirty="0"/>
               <a:t>Mobile Geräte</a:t>
             </a:r>
           </a:p>
@@ -5723,7 +5938,7 @@
 </p:sld>
 </file>
 
-<file path=ppt/slides/slide6.xml><?xml version="1.0" encoding="utf-8"?>
+<file path=ppt/slides/slide7.xml><?xml version="1.0" encoding="utf-8"?>
 <p:sld xmlns:a="http://schemas.openxmlformats.org/drawingml/2006/main" xmlns:r="http://schemas.openxmlformats.org/officeDocument/2006/relationships" xmlns:p="http://schemas.openxmlformats.org/presentationml/2006/main">
   <p:cSld>
     <p:spTree>

</xml_diff>

<commit_message>
Added presentation slides (Testing, Db & HW) Appendices Added
</commit_message>
<xml_diff>
--- a/doc/task02/Presentation_2.pptx
+++ b/doc/task02/Presentation_2.pptx
@@ -5,17 +5,19 @@
     <p:sldMasterId id="2147483648" r:id="rId1"/>
   </p:sldMasterIdLst>
   <p:notesMasterIdLst>
-    <p:notesMasterId r:id="rId7"/>
+    <p:notesMasterId r:id="rId9"/>
   </p:notesMasterIdLst>
   <p:handoutMasterIdLst>
-    <p:handoutMasterId r:id="rId8"/>
+    <p:handoutMasterId r:id="rId10"/>
   </p:handoutMasterIdLst>
   <p:sldIdLst>
     <p:sldId id="262" r:id="rId2"/>
     <p:sldId id="289" r:id="rId3"/>
     <p:sldId id="290" r:id="rId4"/>
     <p:sldId id="291" r:id="rId5"/>
-    <p:sldId id="285" r:id="rId6"/>
+    <p:sldId id="292" r:id="rId6"/>
+    <p:sldId id="293" r:id="rId7"/>
+    <p:sldId id="285" r:id="rId8"/>
   </p:sldIdLst>
   <p:sldSz cx="12192000" cy="6858000"/>
   <p:notesSz cx="6858000" cy="9144000"/>
@@ -220,7 +222,7 @@
             <a:pPr rtl="0"/>
             <a:fld id="{960672BD-261C-4EDC-9C5E-C246835120E7}" type="datetime1">
               <a:rPr lang="de-DE" smtClean="0"/>
-              <a:t>15.04.2018</a:t>
+              <a:t>16.04.2018</a:t>
             </a:fld>
             <a:endParaRPr lang="de-DE" dirty="0"/>
           </a:p>
@@ -288,7 +290,7 @@
             <a:pPr rtl="0"/>
             <a:fld id="{7798501B-77B5-4365-9881-C6E19A3C1E42}" type="slidenum">
               <a:rPr lang="de-DE" smtClean="0"/>
-              <a:t>‹#›</a:t>
+              <a:t>‹Nr.›</a:t>
             </a:fld>
             <a:endParaRPr lang="de-DE" dirty="0"/>
           </a:p>
@@ -390,7 +392,7 @@
             <a:pPr rtl="0"/>
             <a:fld id="{6B5664F4-ABD2-4F09-9758-D36145E15169}" type="datetime1">
               <a:rPr lang="de-DE" smtClean="0"/>
-              <a:t>15.04.2018</a:t>
+              <a:t>16.04.2018</a:t>
             </a:fld>
             <a:endParaRPr lang="de-DE" dirty="0"/>
           </a:p>
@@ -551,7 +553,7 @@
             <a:pPr rtl="0"/>
             <a:fld id="{FC8BD8E7-1312-41F3-99C4-6DA5AF891969}" type="slidenum">
               <a:rPr lang="de-DE" smtClean="0"/>
-              <a:t>‹#›</a:t>
+              <a:t>‹Nr.›</a:t>
             </a:fld>
             <a:endParaRPr lang="de-DE" dirty="0"/>
           </a:p>
@@ -876,7 +878,7 @@
           <a:lstStyle/>
           <a:p>
             <a:r>
-              <a:rPr lang="de-CH" sz="1200" kern="1200" dirty="0" smtClean="0">
+              <a:rPr lang="de-CH" sz="1200" kern="1200" dirty="0">
                 <a:solidFill>
                   <a:schemeClr val="tx1"/>
                 </a:solidFill>
@@ -887,7 +889,7 @@
               </a:rPr>
               <a:t>Die Applikation wird als Webapplikation umgesetzt. Wir unterscheiden zwischen Backend und Frontend der Applikation.</a:t>
             </a:r>
-            <a:endParaRPr lang="en-US" sz="1200" kern="1200" dirty="0" smtClean="0">
+            <a:endParaRPr lang="en-US" sz="1200" kern="1200" dirty="0">
               <a:solidFill>
                 <a:schemeClr val="tx1"/>
               </a:solidFill>
@@ -899,7 +901,7 @@
           </a:p>
           <a:p>
             <a:r>
-              <a:rPr lang="de-CH" sz="1200" b="1" i="1" kern="1200" dirty="0" smtClean="0">
+              <a:rPr lang="de-CH" sz="1200" b="1" i="1" kern="1200" dirty="0">
                 <a:solidFill>
                   <a:schemeClr val="tx1"/>
                 </a:solidFill>
@@ -910,7 +912,7 @@
               </a:rPr>
               <a:t>Backend</a:t>
             </a:r>
-            <a:endParaRPr lang="en-US" sz="1200" b="1" i="1" kern="1200" dirty="0" smtClean="0">
+            <a:endParaRPr lang="en-US" sz="1200" b="1" i="1" kern="1200" dirty="0">
               <a:solidFill>
                 <a:schemeClr val="tx1"/>
               </a:solidFill>
@@ -922,7 +924,7 @@
           </a:p>
           <a:p>
             <a:r>
-              <a:rPr lang="de-CH" sz="1200" kern="1200" dirty="0" smtClean="0">
+              <a:rPr lang="de-CH" sz="1200" kern="1200" dirty="0">
                 <a:solidFill>
                   <a:schemeClr val="tx1"/>
                 </a:solidFill>
@@ -933,7 +935,7 @@
               </a:rPr>
               <a:t>Die Appliaktion wird auf einem Server in der Cloud installiert.</a:t>
             </a:r>
-            <a:endParaRPr lang="en-US" sz="1200" kern="1200" dirty="0" smtClean="0">
+            <a:endParaRPr lang="en-US" sz="1200" kern="1200" dirty="0">
               <a:solidFill>
                 <a:schemeClr val="tx1"/>
               </a:solidFill>
@@ -945,7 +947,7 @@
           </a:p>
           <a:p>
             <a:r>
-              <a:rPr lang="de-CH" sz="1200" kern="1200" dirty="0" smtClean="0">
+              <a:rPr lang="de-CH" sz="1200" kern="1200" dirty="0">
                 <a:solidFill>
                   <a:schemeClr val="tx1"/>
                 </a:solidFill>
@@ -959,7 +961,7 @@
           </a:p>
           <a:p>
             <a:r>
-              <a:rPr lang="de-CH" sz="1200" kern="1200" dirty="0" smtClean="0">
+              <a:rPr lang="de-CH" sz="1200" kern="1200" dirty="0">
                 <a:solidFill>
                   <a:schemeClr val="tx1"/>
                 </a:solidFill>
@@ -973,7 +975,7 @@
           </a:p>
           <a:p>
             <a:r>
-              <a:rPr lang="de-CH" sz="1200" kern="1200" dirty="0" smtClean="0">
+              <a:rPr lang="de-CH" sz="1200" kern="1200" dirty="0">
                 <a:solidFill>
                   <a:schemeClr val="tx1"/>
                 </a:solidFill>
@@ -984,7 +986,7 @@
               </a:rPr>
               <a:t>Die Wartung der Appliaktion und des Servers wird von uns übernommen. Dementsprechend hat der Client kein Aufwand im bereich Wartung und Backup.</a:t>
             </a:r>
-            <a:endParaRPr lang="en-US" sz="1200" kern="1200" dirty="0" smtClean="0">
+            <a:endParaRPr lang="en-US" sz="1200" kern="1200" dirty="0">
               <a:solidFill>
                 <a:schemeClr val="tx1"/>
               </a:solidFill>
@@ -996,7 +998,7 @@
           </a:p>
           <a:p>
             <a:r>
-              <a:rPr lang="de-CH" sz="1200" b="1" i="1" kern="1200" dirty="0" smtClean="0">
+              <a:rPr lang="de-CH" sz="1200" b="1" i="1" kern="1200" dirty="0">
                 <a:solidFill>
                   <a:schemeClr val="tx1"/>
                 </a:solidFill>
@@ -1007,7 +1009,7 @@
               </a:rPr>
               <a:t>Frontend</a:t>
             </a:r>
-            <a:endParaRPr lang="en-US" sz="1200" b="1" i="1" kern="1200" dirty="0" smtClean="0">
+            <a:endParaRPr lang="en-US" sz="1200" b="1" i="1" kern="1200" dirty="0">
               <a:solidFill>
                 <a:schemeClr val="tx1"/>
               </a:solidFill>
@@ -1019,7 +1021,7 @@
           </a:p>
           <a:p>
             <a:r>
-              <a:rPr lang="de-CH" sz="1200" kern="1200" dirty="0" smtClean="0">
+              <a:rPr lang="de-CH" sz="1200" kern="1200" dirty="0">
                 <a:solidFill>
                   <a:schemeClr val="tx1"/>
                 </a:solidFill>
@@ -1030,7 +1032,7 @@
               </a:rPr>
               <a:t>Die Webapplikation ist via Webbrowser aufrubar.</a:t>
             </a:r>
-            <a:endParaRPr lang="en-US" sz="1200" kern="1200" dirty="0" smtClean="0">
+            <a:endParaRPr lang="en-US" sz="1200" kern="1200" dirty="0">
               <a:solidFill>
                 <a:schemeClr val="tx1"/>
               </a:solidFill>
@@ -1042,7 +1044,7 @@
           </a:p>
           <a:p>
             <a:r>
-              <a:rPr lang="de-CH" sz="1200" kern="1200" dirty="0" smtClean="0">
+              <a:rPr lang="de-CH" sz="1200" kern="1200" dirty="0">
                 <a:solidFill>
                   <a:schemeClr val="tx1"/>
                 </a:solidFill>
@@ -1056,7 +1058,7 @@
           </a:p>
           <a:p>
             <a:r>
-              <a:rPr lang="de-CH" sz="1200" kern="1200" dirty="0" smtClean="0">
+              <a:rPr lang="de-CH" sz="1200" kern="1200" dirty="0">
                 <a:solidFill>
                   <a:schemeClr val="tx1"/>
                 </a:solidFill>
@@ -1070,7 +1072,7 @@
           </a:p>
           <a:p>
             <a:r>
-              <a:rPr lang="de-CH" sz="1200" kern="1200" dirty="0" smtClean="0">
+              <a:rPr lang="de-CH" sz="1200" kern="1200" dirty="0">
                 <a:solidFill>
                   <a:schemeClr val="tx1"/>
                 </a:solidFill>
@@ -1113,6 +1115,588 @@
     <p:extLst>
       <p:ext uri="{BB962C8B-B14F-4D97-AF65-F5344CB8AC3E}">
         <p14:creationId xmlns:p14="http://schemas.microsoft.com/office/powerpoint/2010/main" val="783528665"/>
+      </p:ext>
+    </p:extLst>
+  </p:cSld>
+  <p:clrMapOvr>
+    <a:masterClrMapping/>
+  </p:clrMapOvr>
+</p:notes>
+</file>
+
+<file path=ppt/notesSlides/notesSlide4.xml><?xml version="1.0" encoding="utf-8"?>
+<p:notes xmlns:a="http://schemas.openxmlformats.org/drawingml/2006/main" xmlns:r="http://schemas.openxmlformats.org/officeDocument/2006/relationships" xmlns:p="http://schemas.openxmlformats.org/presentationml/2006/main">
+  <p:cSld>
+    <p:spTree>
+      <p:nvGrpSpPr>
+        <p:cNvPr id="1" name=""/>
+        <p:cNvGrpSpPr/>
+        <p:nvPr/>
+      </p:nvGrpSpPr>
+      <p:grpSpPr>
+        <a:xfrm>
+          <a:off x="0" y="0"/>
+          <a:ext cx="0" cy="0"/>
+          <a:chOff x="0" y="0"/>
+          <a:chExt cx="0" cy="0"/>
+        </a:xfrm>
+      </p:grpSpPr>
+      <p:sp>
+        <p:nvSpPr>
+          <p:cNvPr id="2" name="Slide Image Placeholder 1"/>
+          <p:cNvSpPr>
+            <a:spLocks noGrp="1" noRot="1" noChangeAspect="1"/>
+          </p:cNvSpPr>
+          <p:nvPr>
+            <p:ph type="sldImg"/>
+          </p:nvPr>
+        </p:nvSpPr>
+        <p:spPr/>
+      </p:sp>
+      <p:sp>
+        <p:nvSpPr>
+          <p:cNvPr id="3" name="Notes Placeholder 2"/>
+          <p:cNvSpPr>
+            <a:spLocks noGrp="1"/>
+          </p:cNvSpPr>
+          <p:nvPr>
+            <p:ph type="body" idx="1"/>
+          </p:nvPr>
+        </p:nvSpPr>
+        <p:spPr/>
+        <p:txBody>
+          <a:bodyPr/>
+          <a:lstStyle/>
+          <a:p>
+            <a:r>
+              <a:rPr lang="de-CH" sz="1200" kern="1200" dirty="0">
+                <a:solidFill>
+                  <a:schemeClr val="tx1"/>
+                </a:solidFill>
+                <a:effectLst/>
+                <a:latin typeface="+mn-lt"/>
+                <a:ea typeface="+mn-ea"/>
+                <a:cs typeface="+mn-cs"/>
+              </a:rPr>
+              <a:t>Die Applikation wird als Webapplikation umgesetzt. Wir unterscheiden zwischen Backend und Frontend der Applikation.</a:t>
+            </a:r>
+            <a:endParaRPr lang="en-US" sz="1200" kern="1200" dirty="0">
+              <a:solidFill>
+                <a:schemeClr val="tx1"/>
+              </a:solidFill>
+              <a:effectLst/>
+              <a:latin typeface="+mn-lt"/>
+              <a:ea typeface="+mn-ea"/>
+              <a:cs typeface="+mn-cs"/>
+            </a:endParaRPr>
+          </a:p>
+          <a:p>
+            <a:r>
+              <a:rPr lang="de-CH" sz="1200" b="1" i="1" kern="1200" dirty="0">
+                <a:solidFill>
+                  <a:schemeClr val="tx1"/>
+                </a:solidFill>
+                <a:effectLst/>
+                <a:latin typeface="+mn-lt"/>
+                <a:ea typeface="+mn-ea"/>
+                <a:cs typeface="+mn-cs"/>
+              </a:rPr>
+              <a:t>Backend</a:t>
+            </a:r>
+            <a:endParaRPr lang="en-US" sz="1200" b="1" i="1" kern="1200" dirty="0">
+              <a:solidFill>
+                <a:schemeClr val="tx1"/>
+              </a:solidFill>
+              <a:effectLst/>
+              <a:latin typeface="+mn-lt"/>
+              <a:ea typeface="+mn-ea"/>
+              <a:cs typeface="+mn-cs"/>
+            </a:endParaRPr>
+          </a:p>
+          <a:p>
+            <a:r>
+              <a:rPr lang="de-CH" sz="1200" kern="1200" dirty="0">
+                <a:solidFill>
+                  <a:schemeClr val="tx1"/>
+                </a:solidFill>
+                <a:effectLst/>
+                <a:latin typeface="+mn-lt"/>
+                <a:ea typeface="+mn-ea"/>
+                <a:cs typeface="+mn-cs"/>
+              </a:rPr>
+              <a:t>Die Appliaktion wird auf einem Server in der Cloud installiert.</a:t>
+            </a:r>
+            <a:endParaRPr lang="en-US" sz="1200" kern="1200" dirty="0">
+              <a:solidFill>
+                <a:schemeClr val="tx1"/>
+              </a:solidFill>
+              <a:effectLst/>
+              <a:latin typeface="+mn-lt"/>
+              <a:ea typeface="+mn-ea"/>
+              <a:cs typeface="+mn-cs"/>
+            </a:endParaRPr>
+          </a:p>
+          <a:p>
+            <a:r>
+              <a:rPr lang="de-CH" sz="1200" kern="1200" dirty="0">
+                <a:solidFill>
+                  <a:schemeClr val="tx1"/>
+                </a:solidFill>
+                <a:effectLst/>
+                <a:latin typeface="+mn-lt"/>
+                <a:ea typeface="+mn-ea"/>
+                <a:cs typeface="+mn-cs"/>
+              </a:rPr>
+              <a:t>Die Datenverarbeitung und auswertung findet auf dem Server statt. </a:t>
+            </a:r>
+          </a:p>
+          <a:p>
+            <a:r>
+              <a:rPr lang="de-CH" sz="1200" kern="1200" dirty="0">
+                <a:solidFill>
+                  <a:schemeClr val="tx1"/>
+                </a:solidFill>
+                <a:effectLst/>
+                <a:latin typeface="+mn-lt"/>
+                <a:ea typeface="+mn-ea"/>
+                <a:cs typeface="+mn-cs"/>
+              </a:rPr>
+              <a:t>Die Daten werden in einer Datenbank gespeichert auf welche die Applikation zugriff hat. Die Programm Logik wird in Java umgesetzt. </a:t>
+            </a:r>
+          </a:p>
+          <a:p>
+            <a:r>
+              <a:rPr lang="de-CH" sz="1200" kern="1200" dirty="0">
+                <a:solidFill>
+                  <a:schemeClr val="tx1"/>
+                </a:solidFill>
+                <a:effectLst/>
+                <a:latin typeface="+mn-lt"/>
+                <a:ea typeface="+mn-ea"/>
+                <a:cs typeface="+mn-cs"/>
+              </a:rPr>
+              <a:t>Die Wartung der Appliaktion und des Servers wird von uns übernommen. Dementsprechend hat der Client kein Aufwand im bereich Wartung und Backup.</a:t>
+            </a:r>
+            <a:endParaRPr lang="en-US" sz="1200" kern="1200" dirty="0">
+              <a:solidFill>
+                <a:schemeClr val="tx1"/>
+              </a:solidFill>
+              <a:effectLst/>
+              <a:latin typeface="+mn-lt"/>
+              <a:ea typeface="+mn-ea"/>
+              <a:cs typeface="+mn-cs"/>
+            </a:endParaRPr>
+          </a:p>
+          <a:p>
+            <a:r>
+              <a:rPr lang="de-CH" sz="1200" b="1" i="1" kern="1200" dirty="0">
+                <a:solidFill>
+                  <a:schemeClr val="tx1"/>
+                </a:solidFill>
+                <a:effectLst/>
+                <a:latin typeface="+mn-lt"/>
+                <a:ea typeface="+mn-ea"/>
+                <a:cs typeface="+mn-cs"/>
+              </a:rPr>
+              <a:t>Frontend</a:t>
+            </a:r>
+            <a:endParaRPr lang="en-US" sz="1200" b="1" i="1" kern="1200" dirty="0">
+              <a:solidFill>
+                <a:schemeClr val="tx1"/>
+              </a:solidFill>
+              <a:effectLst/>
+              <a:latin typeface="+mn-lt"/>
+              <a:ea typeface="+mn-ea"/>
+              <a:cs typeface="+mn-cs"/>
+            </a:endParaRPr>
+          </a:p>
+          <a:p>
+            <a:r>
+              <a:rPr lang="de-CH" sz="1200" kern="1200" dirty="0">
+                <a:solidFill>
+                  <a:schemeClr val="tx1"/>
+                </a:solidFill>
+                <a:effectLst/>
+                <a:latin typeface="+mn-lt"/>
+                <a:ea typeface="+mn-ea"/>
+                <a:cs typeface="+mn-cs"/>
+              </a:rPr>
+              <a:t>Die Webapplikation ist via Webbrowser aufrubar.</a:t>
+            </a:r>
+            <a:endParaRPr lang="en-US" sz="1200" kern="1200" dirty="0">
+              <a:solidFill>
+                <a:schemeClr val="tx1"/>
+              </a:solidFill>
+              <a:effectLst/>
+              <a:latin typeface="+mn-lt"/>
+              <a:ea typeface="+mn-ea"/>
+              <a:cs typeface="+mn-cs"/>
+            </a:endParaRPr>
+          </a:p>
+          <a:p>
+            <a:r>
+              <a:rPr lang="de-CH" sz="1200" kern="1200" dirty="0">
+                <a:solidFill>
+                  <a:schemeClr val="tx1"/>
+                </a:solidFill>
+                <a:effectLst/>
+                <a:latin typeface="+mn-lt"/>
+                <a:ea typeface="+mn-ea"/>
+                <a:cs typeface="+mn-cs"/>
+              </a:rPr>
+              <a:t>Nach einem erfolgreichem Login werden hier die Daten angezeigt und können bearbeitet werden. </a:t>
+            </a:r>
+          </a:p>
+          <a:p>
+            <a:r>
+              <a:rPr lang="de-CH" sz="1200" kern="1200" dirty="0">
+                <a:solidFill>
+                  <a:schemeClr val="tx1"/>
+                </a:solidFill>
+                <a:effectLst/>
+                <a:latin typeface="+mn-lt"/>
+                <a:ea typeface="+mn-ea"/>
+                <a:cs typeface="+mn-cs"/>
+              </a:rPr>
+              <a:t>Es wird keine lokale Installation benötigt, der Client braucht nur einen moderen Webbrowser. </a:t>
+            </a:r>
+          </a:p>
+          <a:p>
+            <a:r>
+              <a:rPr lang="de-CH" sz="1200" kern="1200" dirty="0">
+                <a:solidFill>
+                  <a:schemeClr val="tx1"/>
+                </a:solidFill>
+                <a:effectLst/>
+                <a:latin typeface="+mn-lt"/>
+                <a:ea typeface="+mn-ea"/>
+                <a:cs typeface="+mn-cs"/>
+              </a:rPr>
+              <a:t>Dies hat den vorteil, dass auch mobile Geräte auf die Webaplikation zugreifen können. Voraussetzung ist ein Responsive Design der Webapplikation, damit auf allen Geräten auch alles optimal dargestellt wird.</a:t>
+            </a:r>
+            <a:endParaRPr lang="en-US" dirty="0"/>
+          </a:p>
+        </p:txBody>
+      </p:sp>
+      <p:sp>
+        <p:nvSpPr>
+          <p:cNvPr id="4" name="Slide Number Placeholder 3"/>
+          <p:cNvSpPr>
+            <a:spLocks noGrp="1"/>
+          </p:cNvSpPr>
+          <p:nvPr>
+            <p:ph type="sldNum" sz="quarter" idx="10"/>
+          </p:nvPr>
+        </p:nvSpPr>
+        <p:spPr/>
+        <p:txBody>
+          <a:bodyPr/>
+          <a:lstStyle/>
+          <a:p>
+            <a:pPr rtl="0"/>
+            <a:fld id="{FC8BD8E7-1312-41F3-99C4-6DA5AF891969}" type="slidenum">
+              <a:rPr lang="de-DE" smtClean="0"/>
+              <a:t>5</a:t>
+            </a:fld>
+            <a:endParaRPr lang="de-DE" dirty="0"/>
+          </a:p>
+        </p:txBody>
+      </p:sp>
+    </p:spTree>
+    <p:extLst>
+      <p:ext uri="{BB962C8B-B14F-4D97-AF65-F5344CB8AC3E}">
+        <p14:creationId xmlns:p14="http://schemas.microsoft.com/office/powerpoint/2010/main" val="2467274737"/>
+      </p:ext>
+    </p:extLst>
+  </p:cSld>
+  <p:clrMapOvr>
+    <a:masterClrMapping/>
+  </p:clrMapOvr>
+</p:notes>
+</file>
+
+<file path=ppt/notesSlides/notesSlide5.xml><?xml version="1.0" encoding="utf-8"?>
+<p:notes xmlns:a="http://schemas.openxmlformats.org/drawingml/2006/main" xmlns:r="http://schemas.openxmlformats.org/officeDocument/2006/relationships" xmlns:p="http://schemas.openxmlformats.org/presentationml/2006/main">
+  <p:cSld>
+    <p:spTree>
+      <p:nvGrpSpPr>
+        <p:cNvPr id="1" name=""/>
+        <p:cNvGrpSpPr/>
+        <p:nvPr/>
+      </p:nvGrpSpPr>
+      <p:grpSpPr>
+        <a:xfrm>
+          <a:off x="0" y="0"/>
+          <a:ext cx="0" cy="0"/>
+          <a:chOff x="0" y="0"/>
+          <a:chExt cx="0" cy="0"/>
+        </a:xfrm>
+      </p:grpSpPr>
+      <p:sp>
+        <p:nvSpPr>
+          <p:cNvPr id="2" name="Slide Image Placeholder 1"/>
+          <p:cNvSpPr>
+            <a:spLocks noGrp="1" noRot="1" noChangeAspect="1"/>
+          </p:cNvSpPr>
+          <p:nvPr>
+            <p:ph type="sldImg"/>
+          </p:nvPr>
+        </p:nvSpPr>
+        <p:spPr/>
+      </p:sp>
+      <p:sp>
+        <p:nvSpPr>
+          <p:cNvPr id="3" name="Notes Placeholder 2"/>
+          <p:cNvSpPr>
+            <a:spLocks noGrp="1"/>
+          </p:cNvSpPr>
+          <p:nvPr>
+            <p:ph type="body" idx="1"/>
+          </p:nvPr>
+        </p:nvSpPr>
+        <p:spPr/>
+        <p:txBody>
+          <a:bodyPr/>
+          <a:lstStyle/>
+          <a:p>
+            <a:r>
+              <a:rPr lang="de-CH" sz="1200" kern="1200" dirty="0">
+                <a:solidFill>
+                  <a:schemeClr val="tx1"/>
+                </a:solidFill>
+                <a:effectLst/>
+                <a:latin typeface="+mn-lt"/>
+                <a:ea typeface="+mn-ea"/>
+                <a:cs typeface="+mn-cs"/>
+              </a:rPr>
+              <a:t>Die Applikation wird als Webapplikation umgesetzt. Wir unterscheiden zwischen Backend und Frontend der Applikation.</a:t>
+            </a:r>
+            <a:endParaRPr lang="en-US" sz="1200" kern="1200" dirty="0">
+              <a:solidFill>
+                <a:schemeClr val="tx1"/>
+              </a:solidFill>
+              <a:effectLst/>
+              <a:latin typeface="+mn-lt"/>
+              <a:ea typeface="+mn-ea"/>
+              <a:cs typeface="+mn-cs"/>
+            </a:endParaRPr>
+          </a:p>
+          <a:p>
+            <a:r>
+              <a:rPr lang="de-CH" sz="1200" b="1" i="1" kern="1200" dirty="0">
+                <a:solidFill>
+                  <a:schemeClr val="tx1"/>
+                </a:solidFill>
+                <a:effectLst/>
+                <a:latin typeface="+mn-lt"/>
+                <a:ea typeface="+mn-ea"/>
+                <a:cs typeface="+mn-cs"/>
+              </a:rPr>
+              <a:t>Backend</a:t>
+            </a:r>
+            <a:endParaRPr lang="en-US" sz="1200" b="1" i="1" kern="1200" dirty="0">
+              <a:solidFill>
+                <a:schemeClr val="tx1"/>
+              </a:solidFill>
+              <a:effectLst/>
+              <a:latin typeface="+mn-lt"/>
+              <a:ea typeface="+mn-ea"/>
+              <a:cs typeface="+mn-cs"/>
+            </a:endParaRPr>
+          </a:p>
+          <a:p>
+            <a:r>
+              <a:rPr lang="de-CH" sz="1200" kern="1200" dirty="0">
+                <a:solidFill>
+                  <a:schemeClr val="tx1"/>
+                </a:solidFill>
+                <a:effectLst/>
+                <a:latin typeface="+mn-lt"/>
+                <a:ea typeface="+mn-ea"/>
+                <a:cs typeface="+mn-cs"/>
+              </a:rPr>
+              <a:t>Die Appliaktion wird auf einem Server in der Cloud installiert.</a:t>
+            </a:r>
+            <a:endParaRPr lang="en-US" sz="1200" kern="1200" dirty="0">
+              <a:solidFill>
+                <a:schemeClr val="tx1"/>
+              </a:solidFill>
+              <a:effectLst/>
+              <a:latin typeface="+mn-lt"/>
+              <a:ea typeface="+mn-ea"/>
+              <a:cs typeface="+mn-cs"/>
+            </a:endParaRPr>
+          </a:p>
+          <a:p>
+            <a:r>
+              <a:rPr lang="de-CH" sz="1200" kern="1200" dirty="0">
+                <a:solidFill>
+                  <a:schemeClr val="tx1"/>
+                </a:solidFill>
+                <a:effectLst/>
+                <a:latin typeface="+mn-lt"/>
+                <a:ea typeface="+mn-ea"/>
+                <a:cs typeface="+mn-cs"/>
+              </a:rPr>
+              <a:t>Die Datenverarbeitung und auswertung findet auf dem Server statt. </a:t>
+            </a:r>
+          </a:p>
+          <a:p>
+            <a:r>
+              <a:rPr lang="de-CH" sz="1200" kern="1200" dirty="0">
+                <a:solidFill>
+                  <a:schemeClr val="tx1"/>
+                </a:solidFill>
+                <a:effectLst/>
+                <a:latin typeface="+mn-lt"/>
+                <a:ea typeface="+mn-ea"/>
+                <a:cs typeface="+mn-cs"/>
+              </a:rPr>
+              <a:t>Die Daten werden in einer Datenbank gespeichert auf welche die Applikation zugriff hat. Die Programm Logik wird in Java umgesetzt. </a:t>
+            </a:r>
+          </a:p>
+          <a:p>
+            <a:r>
+              <a:rPr lang="de-CH" sz="1200" kern="1200" dirty="0">
+                <a:solidFill>
+                  <a:schemeClr val="tx1"/>
+                </a:solidFill>
+                <a:effectLst/>
+                <a:latin typeface="+mn-lt"/>
+                <a:ea typeface="+mn-ea"/>
+                <a:cs typeface="+mn-cs"/>
+              </a:rPr>
+              <a:t>Die Wartung der Appliaktion und des Servers wird von uns übernommen. Dementsprechend hat der Client kein Aufwand im bereich Wartung und Backup.</a:t>
+            </a:r>
+            <a:endParaRPr lang="en-US" sz="1200" kern="1200" dirty="0">
+              <a:solidFill>
+                <a:schemeClr val="tx1"/>
+              </a:solidFill>
+              <a:effectLst/>
+              <a:latin typeface="+mn-lt"/>
+              <a:ea typeface="+mn-ea"/>
+              <a:cs typeface="+mn-cs"/>
+            </a:endParaRPr>
+          </a:p>
+          <a:p>
+            <a:r>
+              <a:rPr lang="de-CH" sz="1200" b="1" i="1" kern="1200" dirty="0">
+                <a:solidFill>
+                  <a:schemeClr val="tx1"/>
+                </a:solidFill>
+                <a:effectLst/>
+                <a:latin typeface="+mn-lt"/>
+                <a:ea typeface="+mn-ea"/>
+                <a:cs typeface="+mn-cs"/>
+              </a:rPr>
+              <a:t>Frontend</a:t>
+            </a:r>
+            <a:endParaRPr lang="en-US" sz="1200" b="1" i="1" kern="1200" dirty="0">
+              <a:solidFill>
+                <a:schemeClr val="tx1"/>
+              </a:solidFill>
+              <a:effectLst/>
+              <a:latin typeface="+mn-lt"/>
+              <a:ea typeface="+mn-ea"/>
+              <a:cs typeface="+mn-cs"/>
+            </a:endParaRPr>
+          </a:p>
+          <a:p>
+            <a:r>
+              <a:rPr lang="de-CH" sz="1200" kern="1200" dirty="0">
+                <a:solidFill>
+                  <a:schemeClr val="tx1"/>
+                </a:solidFill>
+                <a:effectLst/>
+                <a:latin typeface="+mn-lt"/>
+                <a:ea typeface="+mn-ea"/>
+                <a:cs typeface="+mn-cs"/>
+              </a:rPr>
+              <a:t>Die Webapplikation ist via Webbrowser aufrubar.</a:t>
+            </a:r>
+            <a:endParaRPr lang="en-US" sz="1200" kern="1200" dirty="0">
+              <a:solidFill>
+                <a:schemeClr val="tx1"/>
+              </a:solidFill>
+              <a:effectLst/>
+              <a:latin typeface="+mn-lt"/>
+              <a:ea typeface="+mn-ea"/>
+              <a:cs typeface="+mn-cs"/>
+            </a:endParaRPr>
+          </a:p>
+          <a:p>
+            <a:r>
+              <a:rPr lang="de-CH" sz="1200" kern="1200" dirty="0">
+                <a:solidFill>
+                  <a:schemeClr val="tx1"/>
+                </a:solidFill>
+                <a:effectLst/>
+                <a:latin typeface="+mn-lt"/>
+                <a:ea typeface="+mn-ea"/>
+                <a:cs typeface="+mn-cs"/>
+              </a:rPr>
+              <a:t>Nach einem erfolgreichem Login werden hier die Daten angezeigt und können bearbeitet werden. </a:t>
+            </a:r>
+          </a:p>
+          <a:p>
+            <a:r>
+              <a:rPr lang="de-CH" sz="1200" kern="1200" dirty="0">
+                <a:solidFill>
+                  <a:schemeClr val="tx1"/>
+                </a:solidFill>
+                <a:effectLst/>
+                <a:latin typeface="+mn-lt"/>
+                <a:ea typeface="+mn-ea"/>
+                <a:cs typeface="+mn-cs"/>
+              </a:rPr>
+              <a:t>Es wird keine lokale Installation benötigt, der Client braucht nur einen moderen Webbrowser. </a:t>
+            </a:r>
+          </a:p>
+          <a:p>
+            <a:r>
+              <a:rPr lang="de-CH" sz="1200" kern="1200" dirty="0">
+                <a:solidFill>
+                  <a:schemeClr val="tx1"/>
+                </a:solidFill>
+                <a:effectLst/>
+                <a:latin typeface="+mn-lt"/>
+                <a:ea typeface="+mn-ea"/>
+                <a:cs typeface="+mn-cs"/>
+              </a:rPr>
+              <a:t>Dies hat den vorteil, dass auch mobile Geräte auf die Webaplikation zugreifen können. Voraussetzung ist ein Responsive Design der Webapplikation, damit auf allen Geräten auch alles optimal dargestellt wird.</a:t>
+            </a:r>
+            <a:endParaRPr lang="en-US" dirty="0"/>
+          </a:p>
+        </p:txBody>
+      </p:sp>
+      <p:sp>
+        <p:nvSpPr>
+          <p:cNvPr id="4" name="Slide Number Placeholder 3"/>
+          <p:cNvSpPr>
+            <a:spLocks noGrp="1"/>
+          </p:cNvSpPr>
+          <p:nvPr>
+            <p:ph type="sldNum" sz="quarter" idx="10"/>
+          </p:nvPr>
+        </p:nvSpPr>
+        <p:spPr/>
+        <p:txBody>
+          <a:bodyPr/>
+          <a:lstStyle/>
+          <a:p>
+            <a:pPr rtl="0"/>
+            <a:fld id="{FC8BD8E7-1312-41F3-99C4-6DA5AF891969}" type="slidenum">
+              <a:rPr lang="de-DE" smtClean="0"/>
+              <a:t>6</a:t>
+            </a:fld>
+            <a:endParaRPr lang="de-DE" dirty="0"/>
+          </a:p>
+        </p:txBody>
+      </p:sp>
+    </p:spTree>
+    <p:extLst>
+      <p:ext uri="{BB962C8B-B14F-4D97-AF65-F5344CB8AC3E}">
+        <p14:creationId xmlns:p14="http://schemas.microsoft.com/office/powerpoint/2010/main" val="1311299162"/>
       </p:ext>
     </p:extLst>
   </p:cSld>
@@ -1742,7 +2326,7 @@
             <a:pPr rtl="0"/>
             <a:fld id="{6D86D372-411D-4B4E-9C3F-27EFF2F8BE1E}" type="datetime1">
               <a:rPr lang="de-DE" smtClean="0"/>
-              <a:t>15.04.2018</a:t>
+              <a:t>16.04.2018</a:t>
             </a:fld>
             <a:endParaRPr lang="de-DE" dirty="0"/>
           </a:p>
@@ -1766,7 +2350,7 @@
             <a:pPr rtl="0"/>
             <a:fld id="{E31375A4-56A4-47D6-9801-1991572033F7}" type="slidenum">
               <a:rPr lang="de-DE" smtClean="0"/>
-              <a:t>‹#›</a:t>
+              <a:t>‹Nr.›</a:t>
             </a:fld>
             <a:endParaRPr lang="de-DE" dirty="0"/>
           </a:p>
@@ -1949,7 +2533,7 @@
             <a:pPr rtl="0"/>
             <a:fld id="{E326EB1D-CBBF-438D-A188-239583155CD5}" type="datetime1">
               <a:rPr lang="de-DE" smtClean="0"/>
-              <a:t>15.04.2018</a:t>
+              <a:t>16.04.2018</a:t>
             </a:fld>
             <a:endParaRPr lang="de-DE" dirty="0"/>
           </a:p>
@@ -1973,7 +2557,7 @@
             <a:pPr rtl="0"/>
             <a:fld id="{E31375A4-56A4-47D6-9801-1991572033F7}" type="slidenum">
               <a:rPr lang="de-DE" smtClean="0"/>
-              <a:t>‹#›</a:t>
+              <a:t>‹Nr.›</a:t>
             </a:fld>
             <a:endParaRPr lang="de-DE" dirty="0"/>
           </a:p>
@@ -2559,7 +3143,7 @@
             <a:pPr rtl="0"/>
             <a:fld id="{0158FB9A-9055-4D91-A8D6-422B1A47ADD6}" type="datetime1">
               <a:rPr lang="de-DE" smtClean="0"/>
-              <a:t>15.04.2018</a:t>
+              <a:t>16.04.2018</a:t>
             </a:fld>
             <a:endParaRPr lang="de-DE" dirty="0"/>
           </a:p>
@@ -2583,7 +3167,7 @@
             <a:pPr rtl="0"/>
             <a:fld id="{E31375A4-56A4-47D6-9801-1991572033F7}" type="slidenum">
               <a:rPr lang="de-DE" smtClean="0"/>
-              <a:t>‹#›</a:t>
+              <a:t>‹Nr.›</a:t>
             </a:fld>
             <a:endParaRPr lang="de-DE" dirty="0"/>
           </a:p>
@@ -3082,7 +3666,7 @@
             <a:pPr rtl="0"/>
             <a:fld id="{F3AD2B2A-001E-4204-A9F7-ADB62FDFB3C2}" type="datetime1">
               <a:rPr lang="de-DE" smtClean="0"/>
-              <a:t>15.04.2018</a:t>
+              <a:t>16.04.2018</a:t>
             </a:fld>
             <a:endParaRPr lang="de-DE" dirty="0"/>
           </a:p>
@@ -3106,7 +3690,7 @@
             <a:pPr rtl="0"/>
             <a:fld id="{E31375A4-56A4-47D6-9801-1991572033F7}" type="slidenum">
               <a:rPr lang="de-DE" smtClean="0"/>
-              <a:t>‹#›</a:t>
+              <a:t>‹Nr.›</a:t>
             </a:fld>
             <a:endParaRPr lang="de-DE" dirty="0"/>
           </a:p>
@@ -3540,7 +4124,7 @@
             <a:pPr rtl="0"/>
             <a:fld id="{D0598511-F564-4313-9C85-1BB6BF3D8A32}" type="datetime1">
               <a:rPr lang="de-DE" smtClean="0"/>
-              <a:t>15.04.2018</a:t>
+              <a:t>16.04.2018</a:t>
             </a:fld>
             <a:endParaRPr lang="de-DE" dirty="0"/>
           </a:p>
@@ -3564,7 +4148,7 @@
             <a:pPr rtl="0"/>
             <a:fld id="{E31375A4-56A4-47D6-9801-1991572033F7}" type="slidenum">
               <a:rPr lang="de-DE" smtClean="0"/>
-              <a:t>‹#›</a:t>
+              <a:t>‹Nr.›</a:t>
             </a:fld>
             <a:endParaRPr lang="de-DE" dirty="0"/>
           </a:p>
@@ -3678,7 +4262,7 @@
             <a:pPr rtl="0"/>
             <a:fld id="{2E8B8011-CBA9-4FB0-934D-C2F23F0053DB}" type="datetime1">
               <a:rPr lang="de-DE" smtClean="0"/>
-              <a:t>15.04.2018</a:t>
+              <a:t>16.04.2018</a:t>
             </a:fld>
             <a:endParaRPr lang="de-DE" dirty="0"/>
           </a:p>
@@ -3702,7 +4286,7 @@
             <a:pPr rtl="0"/>
             <a:fld id="{E31375A4-56A4-47D6-9801-1991572033F7}" type="slidenum">
               <a:rPr lang="de-DE" smtClean="0"/>
-              <a:t>‹#›</a:t>
+              <a:t>‹Nr.›</a:t>
             </a:fld>
             <a:endParaRPr lang="de-DE" dirty="0"/>
           </a:p>
@@ -4024,7 +4608,7 @@
             <a:pPr rtl="0"/>
             <a:fld id="{62C0A95F-FFB2-4410-A448-2C54BE7723F4}" type="datetime1">
               <a:rPr lang="de-DE" smtClean="0"/>
-              <a:t>15.04.2018</a:t>
+              <a:t>16.04.2018</a:t>
             </a:fld>
             <a:endParaRPr lang="de-DE" dirty="0"/>
           </a:p>
@@ -4048,7 +4632,7 @@
             <a:pPr rtl="0"/>
             <a:fld id="{E31375A4-56A4-47D6-9801-1991572033F7}" type="slidenum">
               <a:rPr lang="de-DE" smtClean="0"/>
-              <a:t>‹#›</a:t>
+              <a:t>‹Nr.›</a:t>
             </a:fld>
             <a:endParaRPr lang="de-DE" dirty="0"/>
           </a:p>
@@ -4318,7 +4902,7 @@
             <a:pPr rtl="0"/>
             <a:fld id="{8C96ADC6-BDC4-42FB-97FB-DA73ECD9CEE8}" type="datetime1">
               <a:rPr lang="de-DE" smtClean="0"/>
-              <a:t>15.04.2018</a:t>
+              <a:t>16.04.2018</a:t>
             </a:fld>
             <a:endParaRPr lang="de-DE" dirty="0"/>
           </a:p>
@@ -4359,7 +4943,7 @@
             <a:fld id="{E31375A4-56A4-47D6-9801-1991572033F7}" type="slidenum">
               <a:rPr lang="de-DE" smtClean="0"/>
               <a:pPr rtl="0"/>
-              <a:t>‹#›</a:t>
+              <a:t>‹Nr.›</a:t>
             </a:fld>
             <a:endParaRPr lang="de-DE" dirty="0"/>
           </a:p>
@@ -4857,7 +5441,7 @@
           <p:cNvPr id="10" name="Bildplatzhalter 9">
             <a:extLst>
               <a:ext uri="{FF2B5EF4-FFF2-40B4-BE49-F238E27FC236}">
-                <a16:creationId xmlns="" xmlns:a16="http://schemas.microsoft.com/office/drawing/2014/main" id="{C29F7C63-F3E3-44C4-851B-F7913AA9706D}"/>
+                <a16:creationId xmlns:a16="http://schemas.microsoft.com/office/drawing/2014/main" id="{C29F7C63-F3E3-44C4-851B-F7913AA9706D}"/>
               </a:ext>
             </a:extLst>
           </p:cNvPr>
@@ -4891,7 +5475,7 @@
           <p:cNvPr id="14" name="Bildplatzhalter 13">
             <a:extLst>
               <a:ext uri="{FF2B5EF4-FFF2-40B4-BE49-F238E27FC236}">
-                <a16:creationId xmlns="" xmlns:a16="http://schemas.microsoft.com/office/drawing/2014/main" id="{A340DC10-DD9A-4562-AAFD-3AD5F391991D}"/>
+                <a16:creationId xmlns:a16="http://schemas.microsoft.com/office/drawing/2014/main" id="{A340DC10-DD9A-4562-AAFD-3AD5F391991D}"/>
               </a:ext>
             </a:extLst>
           </p:cNvPr>
@@ -4925,7 +5509,7 @@
           <p:cNvPr id="18" name="Bildplatzhalter 17">
             <a:extLst>
               <a:ext uri="{FF2B5EF4-FFF2-40B4-BE49-F238E27FC236}">
-                <a16:creationId xmlns="" xmlns:a16="http://schemas.microsoft.com/office/drawing/2014/main" id="{40F64AC5-1EA3-4330-9CA7-B95506CD16D4}"/>
+                <a16:creationId xmlns:a16="http://schemas.microsoft.com/office/drawing/2014/main" id="{40F64AC5-1EA3-4330-9CA7-B95506CD16D4}"/>
               </a:ext>
             </a:extLst>
           </p:cNvPr>
@@ -5024,7 +5608,7 @@
           <p:cNvPr id="18" name="Inhaltsplatzhalter 17">
             <a:extLst>
               <a:ext uri="{FF2B5EF4-FFF2-40B4-BE49-F238E27FC236}">
-                <a16:creationId xmlns="" xmlns:a16="http://schemas.microsoft.com/office/drawing/2014/main" id="{0C719E4D-A698-413D-BA3C-5FAB44B613F4}"/>
+                <a16:creationId xmlns:a16="http://schemas.microsoft.com/office/drawing/2014/main" id="{0C719E4D-A698-413D-BA3C-5FAB44B613F4}"/>
               </a:ext>
             </a:extLst>
           </p:cNvPr>
@@ -5132,15 +5716,7 @@
           <a:p>
             <a:r>
               <a:rPr lang="de-CH" dirty="0"/>
-              <a:t>Database and Hardware </a:t>
-            </a:r>
-            <a:r>
-              <a:rPr lang="de-CH" dirty="0" err="1"/>
-              <a:t>requirements</a:t>
-            </a:r>
-            <a:r>
-              <a:rPr lang="de-CH" dirty="0"/>
-              <a:t> (</a:t>
+              <a:t>Database &amp; Hardware (</a:t>
             </a:r>
             <a:r>
               <a:rPr lang="de-CH" dirty="0" err="1"/>
@@ -5214,10 +5790,9 @@
           <a:lstStyle/>
           <a:p>
             <a:r>
-              <a:rPr lang="en-US" dirty="0" smtClean="0"/>
+              <a:rPr lang="en-US" dirty="0"/>
               <a:t>System Requirement Specification</a:t>
             </a:r>
-            <a:endParaRPr lang="en-US" dirty="0"/>
           </a:p>
         </p:txBody>
       </p:sp>
@@ -5239,93 +5814,92 @@
           <a:lstStyle/>
           <a:p>
             <a:r>
-              <a:rPr lang="en-US" dirty="0" smtClean="0"/>
+              <a:rPr lang="en-US" dirty="0"/>
               <a:t>Functional Requirements</a:t>
             </a:r>
           </a:p>
           <a:p>
-            <a:endParaRPr lang="en-US" dirty="0" smtClean="0"/>
+            <a:endParaRPr lang="en-US" dirty="0"/>
           </a:p>
           <a:p>
             <a:pPr lvl="1"/>
             <a:r>
-              <a:rPr lang="en-US" dirty="0" err="1" smtClean="0"/>
+              <a:rPr lang="en-US" dirty="0" err="1"/>
               <a:t>Angehörigen-Tagebuch</a:t>
             </a:r>
-            <a:endParaRPr lang="en-US" dirty="0" smtClean="0"/>
+            <a:endParaRPr lang="en-US" dirty="0"/>
           </a:p>
           <a:p>
             <a:pPr lvl="1"/>
-            <a:endParaRPr lang="en-US" dirty="0" smtClean="0"/>
+            <a:endParaRPr lang="en-US" dirty="0"/>
           </a:p>
           <a:p>
             <a:pPr lvl="1"/>
             <a:r>
-              <a:rPr lang="en-US" dirty="0" err="1" smtClean="0"/>
+              <a:rPr lang="en-US" dirty="0" err="1"/>
               <a:t>Patienten-Tagebuch</a:t>
             </a:r>
-            <a:endParaRPr lang="en-US" dirty="0" smtClean="0"/>
+            <a:endParaRPr lang="en-US" dirty="0"/>
           </a:p>
           <a:p>
             <a:pPr lvl="1"/>
-            <a:endParaRPr lang="en-US" dirty="0" smtClean="0"/>
+            <a:endParaRPr lang="en-US" dirty="0"/>
           </a:p>
           <a:p>
             <a:pPr lvl="1"/>
             <a:r>
-              <a:rPr lang="en-US" dirty="0" err="1" smtClean="0"/>
+              <a:rPr lang="en-US" dirty="0" err="1"/>
               <a:t>Zielsetzungs</a:t>
             </a:r>
             <a:r>
-              <a:rPr lang="en-US" dirty="0" smtClean="0"/>
+              <a:rPr lang="en-US" dirty="0"/>
               <a:t>-System</a:t>
             </a:r>
           </a:p>
           <a:p>
             <a:pPr lvl="1"/>
-            <a:endParaRPr lang="en-US" dirty="0" smtClean="0"/>
+            <a:endParaRPr lang="en-US" dirty="0"/>
           </a:p>
           <a:p>
             <a:pPr lvl="1"/>
             <a:r>
-              <a:rPr lang="en-US" dirty="0" err="1" smtClean="0"/>
+              <a:rPr lang="en-US" dirty="0" err="1"/>
               <a:t>Berechtigungssystem</a:t>
             </a:r>
-            <a:endParaRPr lang="en-US" dirty="0" smtClean="0"/>
+            <a:endParaRPr lang="en-US" dirty="0"/>
           </a:p>
           <a:p>
             <a:pPr lvl="1"/>
-            <a:endParaRPr lang="en-US" dirty="0" smtClean="0"/>
+            <a:endParaRPr lang="en-US" dirty="0"/>
           </a:p>
           <a:p>
             <a:pPr lvl="1"/>
             <a:r>
-              <a:rPr lang="en-US" dirty="0" smtClean="0"/>
+              <a:rPr lang="en-US" dirty="0"/>
               <a:t>Responsive Design</a:t>
             </a:r>
           </a:p>
           <a:p>
             <a:pPr lvl="1"/>
-            <a:endParaRPr lang="en-US" dirty="0" smtClean="0"/>
+            <a:endParaRPr lang="en-US" dirty="0"/>
           </a:p>
           <a:p>
             <a:pPr lvl="1"/>
             <a:r>
-              <a:rPr lang="en-US" dirty="0" smtClean="0"/>
+              <a:rPr lang="en-US" dirty="0"/>
               <a:t>Data Store</a:t>
             </a:r>
           </a:p>
           <a:p>
             <a:pPr lvl="1"/>
-            <a:endParaRPr lang="en-US" dirty="0" smtClean="0"/>
+            <a:endParaRPr lang="en-US" dirty="0"/>
           </a:p>
           <a:p>
             <a:pPr lvl="1"/>
             <a:r>
-              <a:rPr lang="en-US" dirty="0" smtClean="0"/>
+              <a:rPr lang="en-US" dirty="0"/>
               <a:t>Development</a:t>
             </a:r>
-            <a:endParaRPr lang="en-US" dirty="0"/>
           </a:p>
         </p:txBody>
       </p:sp>
@@ -5347,19 +5921,8 @@
           <a:lstStyle/>
           <a:p>
             <a:r>
-              <a:rPr lang="en-US" dirty="0" smtClean="0"/>
+              <a:rPr lang="en-US" dirty="0"/>
               <a:t>Non-Functional Requirements</a:t>
-            </a:r>
-          </a:p>
-          <a:p>
-            <a:pPr lvl="1"/>
-            <a:endParaRPr lang="en-US" dirty="0" smtClean="0"/>
-          </a:p>
-          <a:p>
-            <a:pPr lvl="1"/>
-            <a:r>
-              <a:rPr lang="en-US" dirty="0" smtClean="0"/>
-              <a:t>Development</a:t>
             </a:r>
           </a:p>
           <a:p>
@@ -5369,8 +5932,8 @@
           <a:p>
             <a:pPr lvl="1"/>
             <a:r>
-              <a:rPr lang="en-US" dirty="0" smtClean="0"/>
-              <a:t>Privacy</a:t>
+              <a:rPr lang="en-US" dirty="0"/>
+              <a:t>Development</a:t>
             </a:r>
           </a:p>
           <a:p>
@@ -5380,10 +5943,20 @@
           <a:p>
             <a:pPr lvl="1"/>
             <a:r>
-              <a:rPr lang="en-US" dirty="0" smtClean="0"/>
+              <a:rPr lang="en-US" dirty="0"/>
+              <a:t>Privacy</a:t>
+            </a:r>
+          </a:p>
+          <a:p>
+            <a:pPr lvl="1"/>
+            <a:endParaRPr lang="en-US" dirty="0"/>
+          </a:p>
+          <a:p>
+            <a:pPr lvl="1"/>
+            <a:r>
+              <a:rPr lang="en-US" dirty="0"/>
               <a:t>Design</a:t>
             </a:r>
-            <a:endParaRPr lang="en-US" dirty="0"/>
           </a:p>
         </p:txBody>
       </p:sp>
@@ -5469,14 +6042,9 @@
           <a:lstStyle/>
           <a:p>
             <a:r>
-              <a:rPr lang="en-US" dirty="0" smtClean="0"/>
-              <a:t>System </a:t>
-            </a:r>
-            <a:r>
-              <a:rPr lang="en-US" dirty="0" smtClean="0"/>
-              <a:t>Architecture</a:t>
-            </a:r>
-            <a:endParaRPr lang="en-US" dirty="0"/>
+              <a:rPr lang="en-US" dirty="0"/>
+              <a:t>System Architecture</a:t>
+            </a:r>
           </a:p>
         </p:txBody>
       </p:sp>
@@ -5501,25 +6069,24 @@
               <a:rPr lang="de-CH" dirty="0"/>
               <a:t>Webapplikation </a:t>
             </a:r>
-            <a:endParaRPr lang="de-CH" dirty="0" smtClean="0"/>
-          </a:p>
-          <a:p>
-            <a:r>
-              <a:rPr lang="de-CH" dirty="0" smtClean="0"/>
+          </a:p>
+          <a:p>
+            <a:r>
+              <a:rPr lang="de-CH" dirty="0"/>
               <a:t>Backend</a:t>
             </a:r>
           </a:p>
           <a:p>
             <a:pPr lvl="1"/>
             <a:r>
-              <a:rPr lang="de-CH" dirty="0" smtClean="0"/>
+              <a:rPr lang="de-CH" dirty="0"/>
               <a:t>Applikation / Server</a:t>
             </a:r>
           </a:p>
           <a:p>
             <a:pPr lvl="1"/>
             <a:r>
-              <a:rPr lang="de-CH" dirty="0" smtClean="0"/>
+              <a:rPr lang="de-CH" dirty="0"/>
               <a:t>Datenbank</a:t>
             </a:r>
           </a:p>
@@ -5528,15 +6095,14 @@
           </a:p>
           <a:p>
             <a:r>
-              <a:rPr lang="de-CH" dirty="0" smtClean="0"/>
+              <a:rPr lang="de-CH" dirty="0"/>
               <a:t>Frontend</a:t>
             </a:r>
-            <a:endParaRPr lang="de-CH" dirty="0"/>
           </a:p>
           <a:p>
             <a:pPr lvl="1"/>
             <a:r>
-              <a:rPr lang="de-CH" dirty="0" smtClean="0"/>
+              <a:rPr lang="de-CH" dirty="0"/>
               <a:t>Browser</a:t>
             </a:r>
           </a:p>
@@ -5544,17 +6110,13 @@
             <a:pPr lvl="1"/>
             <a:r>
               <a:rPr lang="de-CH" dirty="0"/>
-              <a:t>Keine Installation </a:t>
-            </a:r>
-            <a:r>
-              <a:rPr lang="de-CH" dirty="0" smtClean="0"/>
-              <a:t>benötigt</a:t>
+              <a:t>Keine Installation benötigt</a:t>
             </a:r>
           </a:p>
           <a:p>
             <a:pPr lvl="1"/>
             <a:r>
-              <a:rPr lang="de-CH" dirty="0" smtClean="0"/>
+              <a:rPr lang="de-CH" dirty="0"/>
               <a:t>Mobile Geräte</a:t>
             </a:r>
           </a:p>
@@ -5647,10 +6209,531 @@
       </p:grpSpPr>
       <p:sp>
         <p:nvSpPr>
+          <p:cNvPr id="2" name="Title 1"/>
+          <p:cNvSpPr>
+            <a:spLocks noGrp="1"/>
+          </p:cNvSpPr>
+          <p:nvPr>
+            <p:ph type="title"/>
+          </p:nvPr>
+        </p:nvSpPr>
+        <p:spPr>
+          <a:xfrm>
+            <a:off x="1524000" y="397823"/>
+            <a:ext cx="9144000" cy="1143000"/>
+          </a:xfrm>
+        </p:spPr>
+        <p:txBody>
+          <a:bodyPr/>
+          <a:lstStyle/>
+          <a:p>
+            <a:r>
+              <a:rPr lang="de-CH" dirty="0"/>
+              <a:t>T</a:t>
+            </a:r>
+            <a:r>
+              <a:rPr lang="en-US" dirty="0" err="1"/>
+              <a:t>Esting</a:t>
+            </a:r>
+            <a:endParaRPr lang="en-US" dirty="0"/>
+          </a:p>
+        </p:txBody>
+      </p:sp>
+      <p:sp>
+        <p:nvSpPr>
+          <p:cNvPr id="6" name="Content Placeholder 5"/>
+          <p:cNvSpPr>
+            <a:spLocks noGrp="1"/>
+          </p:cNvSpPr>
+          <p:nvPr>
+            <p:ph sz="half" idx="1"/>
+          </p:nvPr>
+        </p:nvSpPr>
+        <p:spPr/>
+        <p:txBody>
+          <a:bodyPr>
+            <a:normAutofit/>
+          </a:bodyPr>
+          <a:lstStyle/>
+          <a:p>
+            <a:r>
+              <a:rPr lang="de-CH" dirty="0"/>
+              <a:t>Komponententests</a:t>
+            </a:r>
+          </a:p>
+          <a:p>
+            <a:r>
+              <a:rPr lang="de-CH" dirty="0"/>
+              <a:t>Integrationstests</a:t>
+            </a:r>
+          </a:p>
+          <a:p>
+            <a:r>
+              <a:rPr lang="de-CH" dirty="0"/>
+              <a:t>Systemtests</a:t>
+            </a:r>
+          </a:p>
+          <a:p>
+            <a:r>
+              <a:rPr lang="de-CH" dirty="0"/>
+              <a:t>Abnahmetest</a:t>
+            </a:r>
+          </a:p>
+        </p:txBody>
+      </p:sp>
+      <p:pic>
+        <p:nvPicPr>
+          <p:cNvPr id="5" name="Inhaltsplatzhalter 4">
+            <a:extLst>
+              <a:ext uri="{FF2B5EF4-FFF2-40B4-BE49-F238E27FC236}">
+                <a16:creationId xmlns:a16="http://schemas.microsoft.com/office/drawing/2014/main" id="{FFB21EEA-3D10-4ECD-9B78-76F302A74EAA}"/>
+              </a:ext>
+            </a:extLst>
+          </p:cNvPr>
+          <p:cNvPicPr>
+            <a:picLocks noGrp="1" noChangeAspect="1"/>
+          </p:cNvPicPr>
+          <p:nvPr>
+            <p:ph sz="half" idx="2"/>
+          </p:nvPr>
+        </p:nvPicPr>
+        <p:blipFill>
+          <a:blip r:embed="rId3"/>
+          <a:stretch>
+            <a:fillRect/>
+          </a:stretch>
+        </p:blipFill>
+        <p:spPr>
+          <a:xfrm>
+            <a:off x="6491287" y="2345531"/>
+            <a:ext cx="3857625" cy="3200400"/>
+          </a:xfrm>
+          <a:prstGeom prst="rect">
+            <a:avLst/>
+          </a:prstGeom>
+        </p:spPr>
+      </p:pic>
+    </p:spTree>
+    <p:extLst>
+      <p:ext uri="{BB962C8B-B14F-4D97-AF65-F5344CB8AC3E}">
+        <p14:creationId xmlns:p14="http://schemas.microsoft.com/office/powerpoint/2010/main" val="2757359361"/>
+      </p:ext>
+    </p:extLst>
+  </p:cSld>
+  <p:clrMapOvr>
+    <a:masterClrMapping/>
+  </p:clrMapOvr>
+  <mc:AlternateContent xmlns:mc="http://schemas.openxmlformats.org/markup-compatibility/2006" xmlns:p14="http://schemas.microsoft.com/office/powerpoint/2010/main">
+    <mc:Choice Requires="p14">
+      <p:transition spd="med" p14:dur="700">
+        <p:fade/>
+      </p:transition>
+    </mc:Choice>
+    <mc:Fallback xmlns="">
+      <p:transition spd="med">
+        <p:fade/>
+      </p:transition>
+    </mc:Fallback>
+  </mc:AlternateContent>
+</p:sld>
+</file>
+
+<file path=ppt/slides/slide6.xml><?xml version="1.0" encoding="utf-8"?>
+<p:sld xmlns:a="http://schemas.openxmlformats.org/drawingml/2006/main" xmlns:r="http://schemas.openxmlformats.org/officeDocument/2006/relationships" xmlns:p="http://schemas.openxmlformats.org/presentationml/2006/main">
+  <p:cSld>
+    <p:spTree>
+      <p:nvGrpSpPr>
+        <p:cNvPr id="1" name=""/>
+        <p:cNvGrpSpPr/>
+        <p:nvPr/>
+      </p:nvGrpSpPr>
+      <p:grpSpPr>
+        <a:xfrm>
+          <a:off x="0" y="0"/>
+          <a:ext cx="0" cy="0"/>
+          <a:chOff x="0" y="0"/>
+          <a:chExt cx="0" cy="0"/>
+        </a:xfrm>
+      </p:grpSpPr>
+      <p:sp>
+        <p:nvSpPr>
+          <p:cNvPr id="2" name="Title 1"/>
+          <p:cNvSpPr>
+            <a:spLocks noGrp="1"/>
+          </p:cNvSpPr>
+          <p:nvPr>
+            <p:ph type="title"/>
+          </p:nvPr>
+        </p:nvSpPr>
+        <p:spPr/>
+        <p:txBody>
+          <a:bodyPr/>
+          <a:lstStyle/>
+          <a:p>
+            <a:r>
+              <a:rPr lang="de-CH" dirty="0"/>
+              <a:t>D</a:t>
+            </a:r>
+            <a:r>
+              <a:rPr lang="en-US" dirty="0" err="1"/>
+              <a:t>atabase</a:t>
+            </a:r>
+            <a:r>
+              <a:rPr lang="en-US" dirty="0"/>
+              <a:t> &amp; Hardware</a:t>
+            </a:r>
+          </a:p>
+        </p:txBody>
+      </p:sp>
+      <p:sp>
+        <p:nvSpPr>
+          <p:cNvPr id="6" name="Content Placeholder 5"/>
+          <p:cNvSpPr>
+            <a:spLocks noGrp="1"/>
+          </p:cNvSpPr>
+          <p:nvPr>
+            <p:ph sz="half" idx="1"/>
+          </p:nvPr>
+        </p:nvSpPr>
+        <p:spPr/>
+        <p:txBody>
+          <a:bodyPr>
+            <a:normAutofit/>
+          </a:bodyPr>
+          <a:lstStyle/>
+          <a:p>
+            <a:r>
+              <a:rPr lang="de-CH" dirty="0"/>
+              <a:t>Entity-</a:t>
+            </a:r>
+            <a:r>
+              <a:rPr lang="de-CH" dirty="0" err="1"/>
+              <a:t>Relationship</a:t>
+            </a:r>
+            <a:r>
+              <a:rPr lang="de-CH" dirty="0"/>
+              <a:t>-Diagramm</a:t>
+            </a:r>
+          </a:p>
+          <a:p>
+            <a:r>
+              <a:rPr lang="de-CH" dirty="0"/>
+              <a:t>Hardwareanforderungen</a:t>
+            </a:r>
+          </a:p>
+        </p:txBody>
+      </p:sp>
+      <p:sp>
+        <p:nvSpPr>
+          <p:cNvPr id="4" name="Inhaltsplatzhalter 3">
+            <a:extLst>
+              <a:ext uri="{FF2B5EF4-FFF2-40B4-BE49-F238E27FC236}">
+                <a16:creationId xmlns:a16="http://schemas.microsoft.com/office/drawing/2014/main" id="{ABC82379-742F-4CBC-8346-664E2AE6F8CD}"/>
+              </a:ext>
+            </a:extLst>
+          </p:cNvPr>
+          <p:cNvSpPr>
+            <a:spLocks noGrp="1"/>
+          </p:cNvSpPr>
+          <p:nvPr>
+            <p:ph sz="half" idx="2"/>
+          </p:nvPr>
+        </p:nvSpPr>
+        <p:spPr/>
+        <p:txBody>
+          <a:bodyPr/>
+          <a:lstStyle/>
+          <a:p>
+            <a:endParaRPr lang="en-US" dirty="0"/>
+          </a:p>
+        </p:txBody>
+      </p:sp>
+      <p:pic>
+        <p:nvPicPr>
+          <p:cNvPr id="5" name="Grafik 4">
+            <a:extLst>
+              <a:ext uri="{FF2B5EF4-FFF2-40B4-BE49-F238E27FC236}">
+                <a16:creationId xmlns:a16="http://schemas.microsoft.com/office/drawing/2014/main" id="{CCC9DC16-76CF-4973-9B82-B4EDE505F1DB}"/>
+              </a:ext>
+            </a:extLst>
+          </p:cNvPr>
+          <p:cNvPicPr>
+            <a:picLocks noChangeAspect="1"/>
+          </p:cNvPicPr>
+          <p:nvPr/>
+        </p:nvPicPr>
+        <p:blipFill>
+          <a:blip r:embed="rId3"/>
+          <a:stretch>
+            <a:fillRect/>
+          </a:stretch>
+        </p:blipFill>
+        <p:spPr>
+          <a:xfrm>
+            <a:off x="5539168" y="3112061"/>
+            <a:ext cx="5761864" cy="2296424"/>
+          </a:xfrm>
+          <a:prstGeom prst="rect">
+            <a:avLst/>
+          </a:prstGeom>
+        </p:spPr>
+      </p:pic>
+    </p:spTree>
+    <p:extLst>
+      <p:ext uri="{BB962C8B-B14F-4D97-AF65-F5344CB8AC3E}">
+        <p14:creationId xmlns:p14="http://schemas.microsoft.com/office/powerpoint/2010/main" val="3362579465"/>
+      </p:ext>
+    </p:extLst>
+  </p:cSld>
+  <p:clrMapOvr>
+    <a:masterClrMapping/>
+  </p:clrMapOvr>
+  <mc:AlternateContent xmlns:mc="http://schemas.openxmlformats.org/markup-compatibility/2006" xmlns:p14="http://schemas.microsoft.com/office/powerpoint/2010/main">
+    <mc:Choice Requires="p14">
+      <p:transition spd="med" p14:dur="700">
+        <p:fade/>
+      </p:transition>
+    </mc:Choice>
+    <mc:Fallback xmlns="">
+      <p:transition spd="med">
+        <p:fade/>
+      </p:transition>
+    </mc:Fallback>
+  </mc:AlternateContent>
+  <p:timing>
+    <p:tnLst>
+      <p:par>
+        <p:cTn id="1" dur="indefinite" restart="never" nodeType="tmRoot">
+          <p:childTnLst>
+            <p:seq concurrent="1" nextAc="seek">
+              <p:cTn id="2" dur="indefinite" nodeType="mainSeq">
+                <p:childTnLst>
+                  <p:par>
+                    <p:cTn id="3" fill="hold">
+                      <p:stCondLst>
+                        <p:cond delay="indefinite"/>
+                      </p:stCondLst>
+                      <p:childTnLst>
+                        <p:par>
+                          <p:cTn id="4" fill="hold">
+                            <p:stCondLst>
+                              <p:cond delay="0"/>
+                            </p:stCondLst>
+                            <p:childTnLst>
+                              <p:par>
+                                <p:cTn id="5" presetID="10" presetClass="entr" presetSubtype="0" fill="hold" grpId="0" nodeType="clickEffect">
+                                  <p:stCondLst>
+                                    <p:cond delay="0"/>
+                                  </p:stCondLst>
+                                  <p:childTnLst>
+                                    <p:set>
+                                      <p:cBhvr>
+                                        <p:cTn id="6" dur="1" fill="hold">
+                                          <p:stCondLst>
+                                            <p:cond delay="0"/>
+                                          </p:stCondLst>
+                                        </p:cTn>
+                                        <p:tgtEl>
+                                          <p:spTgt spid="6">
+                                            <p:txEl>
+                                              <p:pRg st="0" end="0"/>
+                                            </p:txEl>
+                                          </p:spTgt>
+                                        </p:tgtEl>
+                                        <p:attrNameLst>
+                                          <p:attrName>style.visibility</p:attrName>
+                                        </p:attrNameLst>
+                                      </p:cBhvr>
+                                      <p:to>
+                                        <p:strVal val="visible"/>
+                                      </p:to>
+                                    </p:set>
+                                    <p:animEffect transition="in" filter="fade">
+                                      <p:cBhvr>
+                                        <p:cTn id="7" dur="500"/>
+                                        <p:tgtEl>
+                                          <p:spTgt spid="6">
+                                            <p:txEl>
+                                              <p:pRg st="0" end="0"/>
+                                            </p:txEl>
+                                          </p:spTgt>
+                                        </p:tgtEl>
+                                      </p:cBhvr>
+                                    </p:animEffect>
+                                  </p:childTnLst>
+                                </p:cTn>
+                              </p:par>
+                            </p:childTnLst>
+                          </p:cTn>
+                        </p:par>
+                      </p:childTnLst>
+                    </p:cTn>
+                  </p:par>
+                  <p:par>
+                    <p:cTn id="8" fill="hold">
+                      <p:stCondLst>
+                        <p:cond delay="indefinite"/>
+                      </p:stCondLst>
+                      <p:childTnLst>
+                        <p:par>
+                          <p:cTn id="9" fill="hold">
+                            <p:stCondLst>
+                              <p:cond delay="0"/>
+                            </p:stCondLst>
+                            <p:childTnLst>
+                              <p:par>
+                                <p:cTn id="10" presetID="10" presetClass="entr" presetSubtype="0" fill="hold" grpId="0" nodeType="clickEffect">
+                                  <p:stCondLst>
+                                    <p:cond delay="0"/>
+                                  </p:stCondLst>
+                                  <p:childTnLst>
+                                    <p:set>
+                                      <p:cBhvr>
+                                        <p:cTn id="11" dur="1" fill="hold">
+                                          <p:stCondLst>
+                                            <p:cond delay="0"/>
+                                          </p:stCondLst>
+                                        </p:cTn>
+                                        <p:tgtEl>
+                                          <p:spTgt spid="6">
+                                            <p:txEl>
+                                              <p:pRg st="1" end="1"/>
+                                            </p:txEl>
+                                          </p:spTgt>
+                                        </p:tgtEl>
+                                        <p:attrNameLst>
+                                          <p:attrName>style.visibility</p:attrName>
+                                        </p:attrNameLst>
+                                      </p:cBhvr>
+                                      <p:to>
+                                        <p:strVal val="visible"/>
+                                      </p:to>
+                                    </p:set>
+                                    <p:animEffect transition="in" filter="fade">
+                                      <p:cBhvr>
+                                        <p:cTn id="12" dur="500"/>
+                                        <p:tgtEl>
+                                          <p:spTgt spid="6">
+                                            <p:txEl>
+                                              <p:pRg st="1" end="1"/>
+                                            </p:txEl>
+                                          </p:spTgt>
+                                        </p:tgtEl>
+                                      </p:cBhvr>
+                                    </p:animEffect>
+                                  </p:childTnLst>
+                                </p:cTn>
+                              </p:par>
+                            </p:childTnLst>
+                          </p:cTn>
+                        </p:par>
+                      </p:childTnLst>
+                    </p:cTn>
+                  </p:par>
+                  <p:par>
+                    <p:cTn id="13" fill="hold">
+                      <p:stCondLst>
+                        <p:cond delay="indefinite"/>
+                      </p:stCondLst>
+                      <p:childTnLst>
+                        <p:par>
+                          <p:cTn id="14" fill="hold">
+                            <p:stCondLst>
+                              <p:cond delay="0"/>
+                            </p:stCondLst>
+                            <p:childTnLst>
+                              <p:par>
+                                <p:cTn id="15" presetID="10" presetClass="entr" presetSubtype="0" fill="hold" nodeType="clickEffect">
+                                  <p:stCondLst>
+                                    <p:cond delay="0"/>
+                                  </p:stCondLst>
+                                  <p:childTnLst>
+                                    <p:set>
+                                      <p:cBhvr>
+                                        <p:cTn id="16" dur="1" fill="hold">
+                                          <p:stCondLst>
+                                            <p:cond delay="0"/>
+                                          </p:stCondLst>
+                                        </p:cTn>
+                                        <p:tgtEl>
+                                          <p:spTgt spid="5"/>
+                                        </p:tgtEl>
+                                        <p:attrNameLst>
+                                          <p:attrName>style.visibility</p:attrName>
+                                        </p:attrNameLst>
+                                      </p:cBhvr>
+                                      <p:to>
+                                        <p:strVal val="visible"/>
+                                      </p:to>
+                                    </p:set>
+                                    <p:animEffect transition="in" filter="fade">
+                                      <p:cBhvr>
+                                        <p:cTn id="17" dur="500"/>
+                                        <p:tgtEl>
+                                          <p:spTgt spid="5"/>
+                                        </p:tgtEl>
+                                      </p:cBhvr>
+                                    </p:animEffect>
+                                  </p:childTnLst>
+                                </p:cTn>
+                              </p:par>
+                            </p:childTnLst>
+                          </p:cTn>
+                        </p:par>
+                      </p:childTnLst>
+                    </p:cTn>
+                  </p:par>
+                </p:childTnLst>
+              </p:cTn>
+              <p:prevCondLst>
+                <p:cond evt="onPrev" delay="0">
+                  <p:tgtEl>
+                    <p:sldTgt/>
+                  </p:tgtEl>
+                </p:cond>
+              </p:prevCondLst>
+              <p:nextCondLst>
+                <p:cond evt="onNext" delay="0">
+                  <p:tgtEl>
+                    <p:sldTgt/>
+                  </p:tgtEl>
+                </p:cond>
+              </p:nextCondLst>
+            </p:seq>
+          </p:childTnLst>
+        </p:cTn>
+      </p:par>
+    </p:tnLst>
+    <p:bldLst>
+      <p:bldP spid="6" grpId="0" uiExpand="1" build="p"/>
+    </p:bldLst>
+  </p:timing>
+</p:sld>
+</file>
+
+<file path=ppt/slides/slide7.xml><?xml version="1.0" encoding="utf-8"?>
+<p:sld xmlns:a="http://schemas.openxmlformats.org/drawingml/2006/main" xmlns:r="http://schemas.openxmlformats.org/officeDocument/2006/relationships" xmlns:p="http://schemas.openxmlformats.org/presentationml/2006/main">
+  <p:cSld>
+    <p:spTree>
+      <p:nvGrpSpPr>
+        <p:cNvPr id="1" name=""/>
+        <p:cNvGrpSpPr/>
+        <p:nvPr/>
+      </p:nvGrpSpPr>
+      <p:grpSpPr>
+        <a:xfrm>
+          <a:off x="0" y="0"/>
+          <a:ext cx="0" cy="0"/>
+          <a:chOff x="0" y="0"/>
+          <a:chExt cx="0" cy="0"/>
+        </a:xfrm>
+      </p:grpSpPr>
+      <p:sp>
+        <p:nvSpPr>
           <p:cNvPr id="4" name="Titel 3">
             <a:extLst>
               <a:ext uri="{FF2B5EF4-FFF2-40B4-BE49-F238E27FC236}">
-                <a16:creationId xmlns="" xmlns:a16="http://schemas.microsoft.com/office/drawing/2014/main" id="{5ADCBB27-4A02-4FE6-B1B3-EBDF20E85236}"/>
+                <a16:creationId xmlns:a16="http://schemas.microsoft.com/office/drawing/2014/main" id="{5ADCBB27-4A02-4FE6-B1B3-EBDF20E85236}"/>
               </a:ext>
             </a:extLst>
           </p:cNvPr>
@@ -5679,7 +6762,7 @@
           <p:cNvPr id="5" name="Textplatzhalter 4">
             <a:extLst>
               <a:ext uri="{FF2B5EF4-FFF2-40B4-BE49-F238E27FC236}">
-                <a16:creationId xmlns="" xmlns:a16="http://schemas.microsoft.com/office/drawing/2014/main" id="{2511E126-4429-475A-915A-4B265D5F381B}"/>
+                <a16:creationId xmlns:a16="http://schemas.microsoft.com/office/drawing/2014/main" id="{2511E126-4429-475A-915A-4B265D5F381B}"/>
               </a:ext>
             </a:extLst>
           </p:cNvPr>

</xml_diff>

<commit_message>
Added Slides system model
</commit_message>
<xml_diff>
--- a/doc/task02/Presentation_2.pptx
+++ b/doc/task02/Presentation_2.pptx
@@ -5,20 +5,21 @@
     <p:sldMasterId id="2147483648" r:id="rId1"/>
   </p:sldMasterIdLst>
   <p:notesMasterIdLst>
-    <p:notesMasterId r:id="rId10"/>
+    <p:notesMasterId r:id="rId11"/>
   </p:notesMasterIdLst>
   <p:handoutMasterIdLst>
-    <p:handoutMasterId r:id="rId11"/>
+    <p:handoutMasterId r:id="rId12"/>
   </p:handoutMasterIdLst>
   <p:sldIdLst>
     <p:sldId id="262" r:id="rId2"/>
     <p:sldId id="289" r:id="rId3"/>
     <p:sldId id="291" r:id="rId4"/>
     <p:sldId id="290" r:id="rId5"/>
-    <p:sldId id="294" r:id="rId6"/>
-    <p:sldId id="292" r:id="rId7"/>
-    <p:sldId id="293" r:id="rId8"/>
-    <p:sldId id="285" r:id="rId9"/>
+    <p:sldId id="295" r:id="rId6"/>
+    <p:sldId id="294" r:id="rId7"/>
+    <p:sldId id="292" r:id="rId8"/>
+    <p:sldId id="293" r:id="rId9"/>
+    <p:sldId id="285" r:id="rId10"/>
   </p:sldIdLst>
   <p:sldSz cx="12192000" cy="6858000"/>
   <p:notesSz cx="6858000" cy="9144000"/>
@@ -1397,7 +1398,7 @@
             <a:pPr rtl="0"/>
             <a:fld id="{FC8BD8E7-1312-41F3-99C4-6DA5AF891969}" type="slidenum">
               <a:rPr lang="de-DE" smtClean="0"/>
-              <a:t>6</a:t>
+              <a:t>7</a:t>
             </a:fld>
             <a:endParaRPr lang="de-DE" dirty="0"/>
           </a:p>
@@ -1688,7 +1689,7 @@
             <a:pPr rtl="0"/>
             <a:fld id="{FC8BD8E7-1312-41F3-99C4-6DA5AF891969}" type="slidenum">
               <a:rPr lang="de-DE" smtClean="0"/>
-              <a:t>7</a:t>
+              <a:t>8</a:t>
             </a:fld>
             <a:endParaRPr lang="de-DE" dirty="0"/>
           </a:p>
@@ -5673,7 +5674,7 @@
             </a:r>
             <a:r>
               <a:rPr lang="de-CH" dirty="0" err="1"/>
-              <a:t>models</a:t>
+              <a:t>model</a:t>
             </a:r>
             <a:endParaRPr lang="de-CH" dirty="0"/>
           </a:p>
@@ -6191,6 +6192,156 @@
       </p:grpSpPr>
       <p:sp>
         <p:nvSpPr>
+          <p:cNvPr id="2" name="Title 1"/>
+          <p:cNvSpPr>
+            <a:spLocks noGrp="1"/>
+          </p:cNvSpPr>
+          <p:nvPr>
+            <p:ph type="title"/>
+          </p:nvPr>
+        </p:nvSpPr>
+        <p:spPr/>
+        <p:txBody>
+          <a:bodyPr/>
+          <a:lstStyle/>
+          <a:p>
+            <a:r>
+              <a:rPr lang="en-US" dirty="0"/>
+              <a:t>System </a:t>
+            </a:r>
+            <a:r>
+              <a:rPr lang="en-US" dirty="0" err="1"/>
+              <a:t>MOdel</a:t>
+            </a:r>
+            <a:endParaRPr lang="en-US" dirty="0"/>
+          </a:p>
+        </p:txBody>
+      </p:sp>
+      <p:sp>
+        <p:nvSpPr>
+          <p:cNvPr id="3" name="Content Placeholder 2"/>
+          <p:cNvSpPr>
+            <a:spLocks noGrp="1"/>
+          </p:cNvSpPr>
+          <p:nvPr>
+            <p:ph sz="half" idx="1"/>
+          </p:nvPr>
+        </p:nvSpPr>
+        <p:spPr/>
+        <p:txBody>
+          <a:bodyPr>
+            <a:normAutofit/>
+          </a:bodyPr>
+          <a:lstStyle/>
+          <a:p>
+            <a:endParaRPr lang="en-US" dirty="0"/>
+          </a:p>
+        </p:txBody>
+      </p:sp>
+      <p:sp>
+        <p:nvSpPr>
+          <p:cNvPr id="4" name="Content Placeholder 3"/>
+          <p:cNvSpPr>
+            <a:spLocks noGrp="1"/>
+          </p:cNvSpPr>
+          <p:nvPr>
+            <p:ph sz="half" idx="2"/>
+          </p:nvPr>
+        </p:nvSpPr>
+        <p:spPr/>
+        <p:txBody>
+          <a:bodyPr>
+            <a:normAutofit/>
+          </a:bodyPr>
+          <a:lstStyle/>
+          <a:p>
+            <a:endParaRPr lang="en-US" dirty="0"/>
+          </a:p>
+        </p:txBody>
+      </p:sp>
+      <p:pic>
+        <p:nvPicPr>
+          <p:cNvPr id="6" name="Bild 1" descr="../Desktop/Bildschirmfoto%202018-04-15%20um%2020.19.02.png">
+            <a:extLst>
+              <a:ext uri="{FF2B5EF4-FFF2-40B4-BE49-F238E27FC236}">
+                <a16:creationId xmlns:a16="http://schemas.microsoft.com/office/drawing/2014/main" id="{63485F9B-280B-4A60-B70B-A6B3DF56FAF8}"/>
+              </a:ext>
+            </a:extLst>
+          </p:cNvPr>
+          <p:cNvPicPr/>
+          <p:nvPr/>
+        </p:nvPicPr>
+        <p:blipFill>
+          <a:blip r:embed="rId2">
+            <a:extLst>
+              <a:ext uri="{28A0092B-C50C-407E-A947-70E740481C1C}">
+                <a14:useLocalDpi xmlns:a14="http://schemas.microsoft.com/office/drawing/2010/main" val="0"/>
+              </a:ext>
+            </a:extLst>
+          </a:blip>
+          <a:srcRect/>
+          <a:stretch>
+            <a:fillRect/>
+          </a:stretch>
+        </p:blipFill>
+        <p:spPr bwMode="auto">
+          <a:xfrm>
+            <a:off x="1729269" y="1600200"/>
+            <a:ext cx="7509734" cy="4800600"/>
+          </a:xfrm>
+          <a:prstGeom prst="rect">
+            <a:avLst/>
+          </a:prstGeom>
+          <a:noFill/>
+          <a:ln>
+            <a:noFill/>
+          </a:ln>
+        </p:spPr>
+      </p:pic>
+    </p:spTree>
+    <p:extLst>
+      <p:ext uri="{BB962C8B-B14F-4D97-AF65-F5344CB8AC3E}">
+        <p14:creationId xmlns:p14="http://schemas.microsoft.com/office/powerpoint/2010/main" val="1576610402"/>
+      </p:ext>
+    </p:extLst>
+  </p:cSld>
+  <p:clrMapOvr>
+    <a:masterClrMapping/>
+  </p:clrMapOvr>
+  <mc:AlternateContent xmlns:mc="http://schemas.openxmlformats.org/markup-compatibility/2006" xmlns:p14="http://schemas.microsoft.com/office/powerpoint/2010/main">
+    <mc:Choice Requires="p14">
+      <p:transition spd="med" p14:dur="700">
+        <p:fade/>
+      </p:transition>
+    </mc:Choice>
+    <mc:Fallback xmlns="">
+      <p:transition spd="med">
+        <p:fade/>
+      </p:transition>
+    </mc:Fallback>
+  </mc:AlternateContent>
+</p:sld>
+</file>
+
+<file path=ppt/slides/slide6.xml><?xml version="1.0" encoding="utf-8"?>
+<p:sld xmlns:a="http://schemas.openxmlformats.org/drawingml/2006/main" xmlns:r="http://schemas.openxmlformats.org/officeDocument/2006/relationships" xmlns:p="http://schemas.openxmlformats.org/presentationml/2006/main">
+  <p:cSld>
+    <p:spTree>
+      <p:nvGrpSpPr>
+        <p:cNvPr id="1" name=""/>
+        <p:cNvGrpSpPr/>
+        <p:nvPr/>
+      </p:nvGrpSpPr>
+      <p:grpSpPr>
+        <a:xfrm>
+          <a:off x="0" y="0"/>
+          <a:ext cx="0" cy="0"/>
+          <a:chOff x="0" y="0"/>
+          <a:chExt cx="0" cy="0"/>
+        </a:xfrm>
+      </p:grpSpPr>
+      <p:sp>
+        <p:nvSpPr>
           <p:cNvPr id="2" name="Titel 1">
             <a:extLst>
               <a:ext uri="{FF2B5EF4-FFF2-40B4-BE49-F238E27FC236}">
@@ -6363,7 +6514,7 @@
 </p:sld>
 </file>
 
-<file path=ppt/slides/slide6.xml><?xml version="1.0" encoding="utf-8"?>
+<file path=ppt/slides/slide7.xml><?xml version="1.0" encoding="utf-8"?>
 <p:sld xmlns:a="http://schemas.openxmlformats.org/drawingml/2006/main" xmlns:r="http://schemas.openxmlformats.org/officeDocument/2006/relationships" xmlns:p="http://schemas.openxmlformats.org/presentationml/2006/main">
   <p:cSld>
     <p:spTree>
@@ -6511,7 +6662,7 @@
 </p:sld>
 </file>
 
-<file path=ppt/slides/slide7.xml><?xml version="1.0" encoding="utf-8"?>
+<file path=ppt/slides/slide8.xml><?xml version="1.0" encoding="utf-8"?>
 <p:sld xmlns:a="http://schemas.openxmlformats.org/drawingml/2006/main" xmlns:r="http://schemas.openxmlformats.org/officeDocument/2006/relationships" xmlns:p="http://schemas.openxmlformats.org/presentationml/2006/main">
   <p:cSld>
     <p:spTree>
@@ -6643,8 +6794,8 @@
         </p:blipFill>
         <p:spPr>
           <a:xfrm>
-            <a:off x="5539168" y="3112061"/>
-            <a:ext cx="5761864" cy="2296424"/>
+            <a:off x="3562597" y="3112061"/>
+            <a:ext cx="7738435" cy="3084198"/>
           </a:xfrm>
           <a:prstGeom prst="rect">
             <a:avLst/>
@@ -6884,7 +7035,7 @@
 </p:sld>
 </file>
 
-<file path=ppt/slides/slide8.xml><?xml version="1.0" encoding="utf-8"?>
+<file path=ppt/slides/slide9.xml><?xml version="1.0" encoding="utf-8"?>
 <p:sld xmlns:a="http://schemas.openxmlformats.org/drawingml/2006/main" xmlns:r="http://schemas.openxmlformats.org/officeDocument/2006/relationships" xmlns:p="http://schemas.openxmlformats.org/presentationml/2006/main">
   <p:cSld>
     <p:spTree>

</xml_diff>